<commit_message>
Created a Public/Passphrase comparison diagram.
</commit_message>
<xml_diff>
--- a/docs/TripartiteDiagram.pptx
+++ b/docs/TripartiteDiagram.pptx
@@ -5,7 +5,7 @@
     <p:sldMasterId id="2147483660" r:id="rId1"/>
   </p:sldMasterIdLst>
   <p:notesMasterIdLst>
-    <p:notesMasterId r:id="rId8"/>
+    <p:notesMasterId r:id="rId9"/>
   </p:notesMasterIdLst>
   <p:sldIdLst>
     <p:sldId id="278" r:id="rId2"/>
@@ -14,6 +14,7 @@
     <p:sldId id="282" r:id="rId5"/>
     <p:sldId id="283" r:id="rId6"/>
     <p:sldId id="284" r:id="rId7"/>
+    <p:sldId id="285" r:id="rId8"/>
   </p:sldIdLst>
   <p:sldSz cx="12192000" cy="6858000"/>
   <p:notesSz cx="6858000" cy="9144000"/>
@@ -126,6 +127,7 @@
             <p14:sldId id="282"/>
             <p14:sldId id="283"/>
             <p14:sldId id="284"/>
+            <p14:sldId id="285"/>
           </p14:sldIdLst>
         </p14:section>
         <p14:section name="Learn More" id="{2CC34DB2-6590-42C0-AD4B-A04C6060184E}">
@@ -4701,7 +4703,7 @@
       <dgm:prSet phldrT="[Text]" custT="1"/>
       <dgm:spPr>
         <a:solidFill>
-          <a:srgbClr val="009CD6"/>
+          <a:srgbClr val="FF0000"/>
         </a:solidFill>
       </dgm:spPr>
       <dgm:t>
@@ -4745,7 +4747,7 @@
       <dgm:prSet phldrT="[Text]" custT="1"/>
       <dgm:spPr>
         <a:solidFill>
-          <a:srgbClr val="009CD6"/>
+          <a:srgbClr val="FF0000"/>
         </a:solidFill>
       </dgm:spPr>
       <dgm:t>
@@ -4758,7 +4760,7 @@
                 <a:schemeClr val="bg1"/>
               </a:solidFill>
             </a:rPr>
-            <a:t>Miners</a:t>
+            <a:t>Coders</a:t>
           </a:r>
         </a:p>
       </dgm:t>
@@ -4789,7 +4791,7 @@
       <dgm:prSet phldrT="[Text]" custT="1"/>
       <dgm:spPr>
         <a:solidFill>
-          <a:srgbClr val="009CD6"/>
+          <a:srgbClr val="FF0000"/>
         </a:solidFill>
       </dgm:spPr>
       <dgm:t>
@@ -4802,7 +4804,7 @@
                 <a:schemeClr val="bg1"/>
               </a:solidFill>
             </a:rPr>
-            <a:t>Coders</a:t>
+            <a:t>Miners</a:t>
           </a:r>
           <a:endParaRPr lang="en-US" sz="1100" dirty="0">
             <a:solidFill>
@@ -4943,14 +4945,14 @@
       </dgm:t>
     </dgm:pt>
     <dgm:pt modelId="{9F034624-27CB-6A49-9B5B-B136C7E46765}">
-      <dgm:prSet phldrT="[Text]"/>
+      <dgm:prSet phldrT="[Text]" custT="1"/>
       <dgm:spPr/>
       <dgm:t>
         <a:bodyPr/>
         <a:lstStyle/>
         <a:p>
           <a:r>
-            <a:rPr lang="en-US" dirty="0"/>
+            <a:rPr lang="en-US" sz="1000" dirty="0"/>
             <a:t>Version Upgrade</a:t>
           </a:r>
         </a:p>
@@ -4963,7 +4965,7 @@
         <a:bodyPr/>
         <a:lstStyle/>
         <a:p>
-          <a:endParaRPr lang="en-US"/>
+          <a:endParaRPr lang="en-US" sz="2000"/>
         </a:p>
       </dgm:t>
     </dgm:pt>
@@ -4978,19 +4980,19 @@
         <a:bodyPr/>
         <a:lstStyle/>
         <a:p>
-          <a:endParaRPr lang="en-US"/>
+          <a:endParaRPr lang="en-US" sz="2000"/>
         </a:p>
       </dgm:t>
     </dgm:pt>
     <dgm:pt modelId="{602CD7F5-695B-CA4A-8EAA-91CE1F3F3064}">
-      <dgm:prSet phldrT="[Text]"/>
+      <dgm:prSet phldrT="[Text]" custT="1"/>
       <dgm:spPr/>
       <dgm:t>
         <a:bodyPr/>
         <a:lstStyle/>
         <a:p>
           <a:r>
-            <a:rPr lang="en-US" dirty="0"/>
+            <a:rPr lang="en-US" sz="1000" dirty="0"/>
             <a:t>Production Code</a:t>
           </a:r>
         </a:p>
@@ -5003,7 +5005,7 @@
         <a:bodyPr/>
         <a:lstStyle/>
         <a:p>
-          <a:endParaRPr lang="en-US"/>
+          <a:endParaRPr lang="en-US" sz="2000"/>
         </a:p>
       </dgm:t>
     </dgm:pt>
@@ -5018,19 +5020,19 @@
         <a:bodyPr/>
         <a:lstStyle/>
         <a:p>
-          <a:endParaRPr lang="en-US"/>
+          <a:endParaRPr lang="en-US" sz="2000"/>
         </a:p>
       </dgm:t>
     </dgm:pt>
     <dgm:pt modelId="{5218FA24-CCFE-8C47-933D-658D922EB6D1}">
-      <dgm:prSet phldrT="[Text]"/>
+      <dgm:prSet phldrT="[Text]" custT="1"/>
       <dgm:spPr/>
       <dgm:t>
         <a:bodyPr/>
         <a:lstStyle/>
         <a:p>
           <a:r>
-            <a:rPr lang="en-US" dirty="0"/>
+            <a:rPr lang="en-US" sz="1000" dirty="0"/>
             <a:t>Function Requests</a:t>
           </a:r>
         </a:p>
@@ -5043,7 +5045,7 @@
         <a:bodyPr/>
         <a:lstStyle/>
         <a:p>
-          <a:endParaRPr lang="en-US"/>
+          <a:endParaRPr lang="en-US" sz="2000"/>
         </a:p>
       </dgm:t>
     </dgm:pt>
@@ -5058,20 +5060,20 @@
         <a:bodyPr/>
         <a:lstStyle/>
         <a:p>
-          <a:endParaRPr lang="en-US"/>
+          <a:endParaRPr lang="en-US" sz="2000"/>
         </a:p>
       </dgm:t>
     </dgm:pt>
     <dgm:pt modelId="{4F6E15B5-E17F-2A46-ABAF-1A0CDE4BF325}">
-      <dgm:prSet phldrT="[Text]"/>
+      <dgm:prSet phldrT="[Text]" custT="1"/>
       <dgm:spPr/>
       <dgm:t>
         <a:bodyPr/>
         <a:lstStyle/>
         <a:p>
           <a:r>
-            <a:rPr lang="en-US" dirty="0"/>
-            <a:t>Customer Crisis</a:t>
+            <a:rPr lang="en-US" sz="1000" dirty="0"/>
+            <a:t>User Crisis</a:t>
           </a:r>
         </a:p>
       </dgm:t>
@@ -5083,7 +5085,7 @@
         <a:bodyPr/>
         <a:lstStyle/>
         <a:p>
-          <a:endParaRPr lang="en-US"/>
+          <a:endParaRPr lang="en-US" sz="2000"/>
         </a:p>
       </dgm:t>
     </dgm:pt>
@@ -5098,19 +5100,19 @@
         <a:bodyPr/>
         <a:lstStyle/>
         <a:p>
-          <a:endParaRPr lang="en-US"/>
+          <a:endParaRPr lang="en-US" sz="2000"/>
         </a:p>
       </dgm:t>
     </dgm:pt>
     <dgm:pt modelId="{493B6E06-6A4B-7C41-A700-7212E97D771F}">
-      <dgm:prSet phldrT="[Text]"/>
+      <dgm:prSet phldrT="[Text]" custT="1"/>
       <dgm:spPr/>
       <dgm:t>
         <a:bodyPr/>
         <a:lstStyle/>
         <a:p>
           <a:r>
-            <a:rPr lang="en-US" dirty="0"/>
+            <a:rPr lang="en-US" sz="1000" dirty="0"/>
             <a:t>Feature Revolution</a:t>
           </a:r>
         </a:p>
@@ -5123,7 +5125,7 @@
         <a:bodyPr/>
         <a:lstStyle/>
         <a:p>
-          <a:endParaRPr lang="en-US"/>
+          <a:endParaRPr lang="en-US" sz="2000"/>
         </a:p>
       </dgm:t>
     </dgm:pt>
@@ -5138,7 +5140,7 @@
         <a:bodyPr/>
         <a:lstStyle/>
         <a:p>
-          <a:endParaRPr lang="en-US"/>
+          <a:endParaRPr lang="en-US" sz="2000"/>
         </a:p>
       </dgm:t>
     </dgm:pt>
@@ -5172,7 +5174,7 @@
       <dgm:spPr/>
     </dgm:pt>
     <dgm:pt modelId="{E7465A14-25F9-684C-9B1D-25E428F98353}" type="pres">
-      <dgm:prSet presAssocID="{602CD7F5-695B-CA4A-8EAA-91CE1F3F3064}" presName="node" presStyleLbl="revTx" presStyleIdx="1" presStyleCnt="5">
+      <dgm:prSet presAssocID="{602CD7F5-695B-CA4A-8EAA-91CE1F3F3064}" presName="node" presStyleLbl="revTx" presStyleIdx="1" presStyleCnt="5" custScaleX="146485">
         <dgm:presLayoutVars>
           <dgm:bulletEnabled val="1"/>
         </dgm:presLayoutVars>
@@ -5220,7 +5222,7 @@
       <dgm:spPr/>
     </dgm:pt>
     <dgm:pt modelId="{0F011057-9A25-8843-9B4F-7B69153780CF}" type="pres">
-      <dgm:prSet presAssocID="{493B6E06-6A4B-7C41-A700-7212E97D771F}" presName="node" presStyleLbl="revTx" presStyleIdx="4" presStyleCnt="5">
+      <dgm:prSet presAssocID="{493B6E06-6A4B-7C41-A700-7212E97D771F}" presName="node" presStyleLbl="revTx" presStyleIdx="4" presStyleCnt="5" custScaleX="150906">
         <dgm:presLayoutVars>
           <dgm:bulletEnabled val="1"/>
         </dgm:presLayoutVars>
@@ -5290,17 +5292,17 @@
       </dgm:t>
     </dgm:pt>
     <dgm:pt modelId="{1609A299-3CD2-9146-B5A6-D928655D6D5A}">
-      <dgm:prSet phldrT="[Text]"/>
+      <dgm:prSet phldrT="[Text]" custT="1"/>
       <dgm:spPr/>
       <dgm:t>
         <a:bodyPr/>
         <a:lstStyle/>
         <a:p>
           <a:r>
-            <a:rPr lang="en-US"/>
+            <a:rPr lang="en-US" sz="1000"/>
             <a:t>Perform Checking</a:t>
           </a:r>
-          <a:endParaRPr lang="en-US" dirty="0"/>
+          <a:endParaRPr lang="en-US" sz="1000" dirty="0"/>
         </a:p>
       </dgm:t>
     </dgm:pt>
@@ -5311,7 +5313,7 @@
         <a:bodyPr/>
         <a:lstStyle/>
         <a:p>
-          <a:endParaRPr lang="en-US"/>
+          <a:endParaRPr lang="en-US" sz="2400"/>
         </a:p>
       </dgm:t>
     </dgm:pt>
@@ -5326,19 +5328,19 @@
         <a:bodyPr/>
         <a:lstStyle/>
         <a:p>
-          <a:endParaRPr lang="en-US"/>
+          <a:endParaRPr lang="en-US" sz="2400"/>
         </a:p>
       </dgm:t>
     </dgm:pt>
     <dgm:pt modelId="{CEF25157-D4DA-F143-AF3B-CBD8801321FC}">
-      <dgm:prSet phldrT="[Text]"/>
+      <dgm:prSet phldrT="[Text]" custT="1"/>
       <dgm:spPr/>
       <dgm:t>
         <a:bodyPr/>
         <a:lstStyle/>
         <a:p>
           <a:r>
-            <a:rPr lang="en-US" dirty="0"/>
+            <a:rPr lang="en-US" sz="1000" dirty="0"/>
             <a:t>receive confirmation</a:t>
           </a:r>
         </a:p>
@@ -5351,7 +5353,7 @@
         <a:bodyPr/>
         <a:lstStyle/>
         <a:p>
-          <a:endParaRPr lang="en-US"/>
+          <a:endParaRPr lang="en-US" sz="2400"/>
         </a:p>
       </dgm:t>
     </dgm:pt>
@@ -5366,19 +5368,19 @@
         <a:bodyPr/>
         <a:lstStyle/>
         <a:p>
-          <a:endParaRPr lang="en-US"/>
+          <a:endParaRPr lang="en-US" sz="2400"/>
         </a:p>
       </dgm:t>
     </dgm:pt>
     <dgm:pt modelId="{0603E04B-A48C-3F41-A4A9-DB3442C4AEC1}">
-      <dgm:prSet phldrT="[Text]"/>
+      <dgm:prSet phldrT="[Text]" custT="1"/>
       <dgm:spPr/>
       <dgm:t>
         <a:bodyPr/>
         <a:lstStyle/>
         <a:p>
           <a:r>
-            <a:rPr lang="en-US" dirty="0"/>
+            <a:rPr lang="en-US" sz="1000" dirty="0"/>
             <a:t>commit transaction</a:t>
           </a:r>
         </a:p>
@@ -5391,7 +5393,7 @@
         <a:bodyPr/>
         <a:lstStyle/>
         <a:p>
-          <a:endParaRPr lang="en-US"/>
+          <a:endParaRPr lang="en-US" sz="2400"/>
         </a:p>
       </dgm:t>
     </dgm:pt>
@@ -5406,7 +5408,7 @@
         <a:bodyPr/>
         <a:lstStyle/>
         <a:p>
-          <a:endParaRPr lang="en-US"/>
+          <a:endParaRPr lang="en-US" sz="2400"/>
         </a:p>
       </dgm:t>
     </dgm:pt>
@@ -5440,7 +5442,7 @@
       <dgm:spPr/>
     </dgm:pt>
     <dgm:pt modelId="{F4CEAB4A-E04E-764C-A2E3-B5DD2444E2CB}" type="pres">
-      <dgm:prSet presAssocID="{CEF25157-D4DA-F143-AF3B-CBD8801321FC}" presName="node" presStyleLbl="revTx" presStyleIdx="1" presStyleCnt="3">
+      <dgm:prSet presAssocID="{CEF25157-D4DA-F143-AF3B-CBD8801321FC}" presName="node" presStyleLbl="revTx" presStyleIdx="1" presStyleCnt="3" custScaleX="142771">
         <dgm:presLayoutVars>
           <dgm:bulletEnabled val="1"/>
         </dgm:presLayoutVars>
@@ -5456,7 +5458,7 @@
       <dgm:spPr/>
     </dgm:pt>
     <dgm:pt modelId="{04C13EFA-7920-804C-A5A7-F2C2DA43A957}" type="pres">
-      <dgm:prSet presAssocID="{0603E04B-A48C-3F41-A4A9-DB3442C4AEC1}" presName="node" presStyleLbl="revTx" presStyleIdx="2" presStyleCnt="3">
+      <dgm:prSet presAssocID="{0603E04B-A48C-3F41-A4A9-DB3442C4AEC1}" presName="node" presStyleLbl="revTx" presStyleIdx="2" presStyleCnt="3" custScaleX="119604">
         <dgm:presLayoutVars>
           <dgm:bulletEnabled val="1"/>
         </dgm:presLayoutVars>
@@ -6510,7 +6512,7 @@
           <a:avLst/>
         </a:prstGeom>
         <a:solidFill>
-          <a:srgbClr val="009CD6"/>
+          <a:srgbClr val="FF0000"/>
         </a:solidFill>
         <a:ln w="12700" cap="flat" cmpd="sng" algn="ctr">
           <a:solidFill>
@@ -6643,7 +6645,7 @@
           <a:avLst/>
         </a:prstGeom>
         <a:solidFill>
-          <a:srgbClr val="009CD6"/>
+          <a:srgbClr val="FF0000"/>
         </a:solidFill>
         <a:ln w="12700" cap="flat" cmpd="sng" algn="ctr">
           <a:solidFill>
@@ -6697,7 +6699,7 @@
                 <a:schemeClr val="bg1"/>
               </a:solidFill>
             </a:rPr>
-            <a:t>Miners</a:t>
+            <a:t>Coders</a:t>
           </a:r>
         </a:p>
       </dsp:txBody>
@@ -6776,7 +6778,7 @@
           <a:avLst/>
         </a:prstGeom>
         <a:solidFill>
-          <a:srgbClr val="009CD6"/>
+          <a:srgbClr val="FF0000"/>
         </a:solidFill>
         <a:ln w="12700" cap="flat" cmpd="sng" algn="ctr">
           <a:solidFill>
@@ -6830,7 +6832,7 @@
                 <a:schemeClr val="bg1"/>
               </a:solidFill>
             </a:rPr>
-            <a:t>Coders</a:t>
+            <a:t>Miners</a:t>
           </a:r>
           <a:endParaRPr lang="en-US" sz="1100" kern="1200" dirty="0">
             <a:solidFill>
@@ -6863,7 +6865,7 @@
       </dsp:nvSpPr>
       <dsp:spPr>
         <a:xfrm>
-          <a:off x="1911750" y="16510"/>
+          <a:off x="1844714" y="16510"/>
           <a:ext cx="576837" cy="576837"/>
         </a:xfrm>
         <a:prstGeom prst="rect">
@@ -6888,12 +6890,12 @@
         <a:fontRef idx="minor"/>
       </dsp:style>
       <dsp:txBody>
-        <a:bodyPr spcFirstLastPara="0" vert="horz" wrap="square" lIns="11430" tIns="11430" rIns="11430" bIns="11430" numCol="1" spcCol="1270" anchor="ctr" anchorCtr="0">
+        <a:bodyPr spcFirstLastPara="0" vert="horz" wrap="square" lIns="12700" tIns="12700" rIns="12700" bIns="12700" numCol="1" spcCol="1270" anchor="ctr" anchorCtr="0">
           <a:noAutofit/>
         </a:bodyPr>
         <a:lstStyle/>
         <a:p>
-          <a:pPr marL="0" lvl="0" indent="0" algn="ctr" defTabSz="400050">
+          <a:pPr marL="0" lvl="0" indent="0" algn="ctr" defTabSz="444500">
             <a:lnSpc>
               <a:spcPct val="90000"/>
             </a:lnSpc>
@@ -6906,13 +6908,13 @@
             <a:buNone/>
           </a:pPr>
           <a:r>
-            <a:rPr lang="en-US" sz="900" kern="1200" dirty="0"/>
+            <a:rPr lang="en-US" sz="1000" kern="1200" dirty="0"/>
             <a:t>Version Upgrade</a:t>
           </a:r>
         </a:p>
       </dsp:txBody>
       <dsp:txXfrm>
-        <a:off x="1911750" y="16510"/>
+        <a:off x="1844714" y="16510"/>
         <a:ext cx="576837" cy="576837"/>
       </dsp:txXfrm>
     </dsp:sp>
@@ -6923,7 +6925,7 @@
       </dsp:nvSpPr>
       <dsp:spPr>
         <a:xfrm>
-          <a:off x="554959" y="-160"/>
+          <a:off x="487923" y="-160"/>
           <a:ext cx="2162553" cy="2162553"/>
         </a:xfrm>
         <a:prstGeom prst="circularArrow">
@@ -6974,8 +6976,8 @@
       </dsp:nvSpPr>
       <dsp:spPr>
         <a:xfrm>
-          <a:off x="2260279" y="1089174"/>
-          <a:ext cx="576837" cy="576837"/>
+          <a:off x="2059172" y="1089174"/>
+          <a:ext cx="844979" cy="576837"/>
         </a:xfrm>
         <a:prstGeom prst="rect">
           <a:avLst/>
@@ -6999,12 +7001,12 @@
         <a:fontRef idx="minor"/>
       </dsp:style>
       <dsp:txBody>
-        <a:bodyPr spcFirstLastPara="0" vert="horz" wrap="square" lIns="11430" tIns="11430" rIns="11430" bIns="11430" numCol="1" spcCol="1270" anchor="ctr" anchorCtr="0">
+        <a:bodyPr spcFirstLastPara="0" vert="horz" wrap="square" lIns="12700" tIns="12700" rIns="12700" bIns="12700" numCol="1" spcCol="1270" anchor="ctr" anchorCtr="0">
           <a:noAutofit/>
         </a:bodyPr>
         <a:lstStyle/>
         <a:p>
-          <a:pPr marL="0" lvl="0" indent="0" algn="ctr" defTabSz="400050">
+          <a:pPr marL="0" lvl="0" indent="0" algn="ctr" defTabSz="444500">
             <a:lnSpc>
               <a:spcPct val="90000"/>
             </a:lnSpc>
@@ -7017,14 +7019,14 @@
             <a:buNone/>
           </a:pPr>
           <a:r>
-            <a:rPr lang="en-US" sz="900" kern="1200" dirty="0"/>
+            <a:rPr lang="en-US" sz="1000" kern="1200" dirty="0"/>
             <a:t>Production Code</a:t>
           </a:r>
         </a:p>
       </dsp:txBody>
       <dsp:txXfrm>
-        <a:off x="2260279" y="1089174"/>
-        <a:ext cx="576837" cy="576837"/>
+        <a:off x="2059172" y="1089174"/>
+        <a:ext cx="844979" cy="576837"/>
       </dsp:txXfrm>
     </dsp:sp>
     <dsp:sp modelId="{9A431B6C-419A-8641-B38A-C94FDB8AE560}">
@@ -7034,7 +7036,7 @@
       </dsp:nvSpPr>
       <dsp:spPr>
         <a:xfrm>
-          <a:off x="554959" y="-160"/>
+          <a:off x="487923" y="-160"/>
           <a:ext cx="2162553" cy="2162553"/>
         </a:xfrm>
         <a:prstGeom prst="circularArrow">
@@ -7085,7 +7087,7 @@
       </dsp:nvSpPr>
       <dsp:spPr>
         <a:xfrm>
-          <a:off x="1347817" y="1752117"/>
+          <a:off x="1280781" y="1752117"/>
           <a:ext cx="576837" cy="576837"/>
         </a:xfrm>
         <a:prstGeom prst="rect">
@@ -7110,12 +7112,12 @@
         <a:fontRef idx="minor"/>
       </dsp:style>
       <dsp:txBody>
-        <a:bodyPr spcFirstLastPara="0" vert="horz" wrap="square" lIns="11430" tIns="11430" rIns="11430" bIns="11430" numCol="1" spcCol="1270" anchor="ctr" anchorCtr="0">
+        <a:bodyPr spcFirstLastPara="0" vert="horz" wrap="square" lIns="12700" tIns="12700" rIns="12700" bIns="12700" numCol="1" spcCol="1270" anchor="ctr" anchorCtr="0">
           <a:noAutofit/>
         </a:bodyPr>
         <a:lstStyle/>
         <a:p>
-          <a:pPr marL="0" lvl="0" indent="0" algn="ctr" defTabSz="400050">
+          <a:pPr marL="0" lvl="0" indent="0" algn="ctr" defTabSz="444500">
             <a:lnSpc>
               <a:spcPct val="90000"/>
             </a:lnSpc>
@@ -7128,13 +7130,13 @@
             <a:buNone/>
           </a:pPr>
           <a:r>
-            <a:rPr lang="en-US" sz="900" kern="1200" dirty="0"/>
+            <a:rPr lang="en-US" sz="1000" kern="1200" dirty="0"/>
             <a:t>Function Requests</a:t>
           </a:r>
         </a:p>
       </dsp:txBody>
       <dsp:txXfrm>
-        <a:off x="1347817" y="1752117"/>
+        <a:off x="1280781" y="1752117"/>
         <a:ext cx="576837" cy="576837"/>
       </dsp:txXfrm>
     </dsp:sp>
@@ -7145,7 +7147,7 @@
       </dsp:nvSpPr>
       <dsp:spPr>
         <a:xfrm>
-          <a:off x="554959" y="-160"/>
+          <a:off x="487923" y="-160"/>
           <a:ext cx="2162553" cy="2162553"/>
         </a:xfrm>
         <a:prstGeom prst="circularArrow">
@@ -7196,7 +7198,7 @@
       </dsp:nvSpPr>
       <dsp:spPr>
         <a:xfrm>
-          <a:off x="435354" y="1089174"/>
+          <a:off x="368319" y="1089174"/>
           <a:ext cx="576837" cy="576837"/>
         </a:xfrm>
         <a:prstGeom prst="rect">
@@ -7221,12 +7223,12 @@
         <a:fontRef idx="minor"/>
       </dsp:style>
       <dsp:txBody>
-        <a:bodyPr spcFirstLastPara="0" vert="horz" wrap="square" lIns="11430" tIns="11430" rIns="11430" bIns="11430" numCol="1" spcCol="1270" anchor="ctr" anchorCtr="0">
+        <a:bodyPr spcFirstLastPara="0" vert="horz" wrap="square" lIns="12700" tIns="12700" rIns="12700" bIns="12700" numCol="1" spcCol="1270" anchor="ctr" anchorCtr="0">
           <a:noAutofit/>
         </a:bodyPr>
         <a:lstStyle/>
         <a:p>
-          <a:pPr marL="0" lvl="0" indent="0" algn="ctr" defTabSz="400050">
+          <a:pPr marL="0" lvl="0" indent="0" algn="ctr" defTabSz="444500">
             <a:lnSpc>
               <a:spcPct val="90000"/>
             </a:lnSpc>
@@ -7239,13 +7241,13 @@
             <a:buNone/>
           </a:pPr>
           <a:r>
-            <a:rPr lang="en-US" sz="900" kern="1200" dirty="0"/>
-            <a:t>Customer Crisis</a:t>
+            <a:rPr lang="en-US" sz="1000" kern="1200" dirty="0"/>
+            <a:t>User Crisis</a:t>
           </a:r>
         </a:p>
       </dsp:txBody>
       <dsp:txXfrm>
-        <a:off x="435354" y="1089174"/>
+        <a:off x="368319" y="1089174"/>
         <a:ext cx="576837" cy="576837"/>
       </dsp:txXfrm>
     </dsp:sp>
@@ -7256,7 +7258,7 @@
       </dsp:nvSpPr>
       <dsp:spPr>
         <a:xfrm>
-          <a:off x="554959" y="-160"/>
+          <a:off x="487923" y="-160"/>
           <a:ext cx="2162553" cy="2162553"/>
         </a:xfrm>
         <a:prstGeom prst="circularArrow">
@@ -7307,8 +7309,8 @@
       </dsp:nvSpPr>
       <dsp:spPr>
         <a:xfrm>
-          <a:off x="783884" y="16510"/>
-          <a:ext cx="576837" cy="576837"/>
+          <a:off x="570026" y="16510"/>
+          <a:ext cx="870481" cy="576837"/>
         </a:xfrm>
         <a:prstGeom prst="rect">
           <a:avLst/>
@@ -7332,12 +7334,12 @@
         <a:fontRef idx="minor"/>
       </dsp:style>
       <dsp:txBody>
-        <a:bodyPr spcFirstLastPara="0" vert="horz" wrap="square" lIns="11430" tIns="11430" rIns="11430" bIns="11430" numCol="1" spcCol="1270" anchor="ctr" anchorCtr="0">
+        <a:bodyPr spcFirstLastPara="0" vert="horz" wrap="square" lIns="12700" tIns="12700" rIns="12700" bIns="12700" numCol="1" spcCol="1270" anchor="ctr" anchorCtr="0">
           <a:noAutofit/>
         </a:bodyPr>
         <a:lstStyle/>
         <a:p>
-          <a:pPr marL="0" lvl="0" indent="0" algn="ctr" defTabSz="400050">
+          <a:pPr marL="0" lvl="0" indent="0" algn="ctr" defTabSz="444500">
             <a:lnSpc>
               <a:spcPct val="90000"/>
             </a:lnSpc>
@@ -7350,14 +7352,14 @@
             <a:buNone/>
           </a:pPr>
           <a:r>
-            <a:rPr lang="en-US" sz="900" kern="1200" dirty="0"/>
+            <a:rPr lang="en-US" sz="1000" kern="1200" dirty="0"/>
             <a:t>Feature Revolution</a:t>
           </a:r>
         </a:p>
       </dsp:txBody>
       <dsp:txXfrm>
-        <a:off x="783884" y="16510"/>
-        <a:ext cx="576837" cy="576837"/>
+        <a:off x="570026" y="16510"/>
+        <a:ext cx="870481" cy="576837"/>
       </dsp:txXfrm>
     </dsp:sp>
     <dsp:sp modelId="{8E0C84DF-0561-5248-9985-A607043D6F4D}">
@@ -7367,7 +7369,7 @@
       </dsp:nvSpPr>
       <dsp:spPr>
         <a:xfrm>
-          <a:off x="554959" y="-160"/>
+          <a:off x="487923" y="-160"/>
           <a:ext cx="2162553" cy="2162553"/>
         </a:xfrm>
         <a:prstGeom prst="circularArrow">
@@ -7375,7 +7377,7 @@
             <a:gd name="adj1" fmla="val 5201"/>
             <a:gd name="adj2" fmla="val 336004"/>
             <a:gd name="adj3" fmla="val 16865303"/>
-            <a:gd name="adj4" fmla="val 15198692"/>
+            <a:gd name="adj4" fmla="val 15737483"/>
             <a:gd name="adj5" fmla="val 6068"/>
           </a:avLst>
         </a:prstGeom>
@@ -7430,7 +7432,7 @@
       </dsp:nvSpPr>
       <dsp:spPr>
         <a:xfrm>
-          <a:off x="1057041" y="146201"/>
+          <a:off x="1087868" y="146201"/>
           <a:ext cx="629005" cy="629005"/>
         </a:xfrm>
         <a:prstGeom prst="rect">
@@ -7455,12 +7457,12 @@
         <a:fontRef idx="minor"/>
       </dsp:style>
       <dsp:txBody>
-        <a:bodyPr spcFirstLastPara="0" vert="horz" wrap="square" lIns="10160" tIns="10160" rIns="10160" bIns="10160" numCol="1" spcCol="1270" anchor="ctr" anchorCtr="0">
+        <a:bodyPr spcFirstLastPara="0" vert="horz" wrap="square" lIns="12700" tIns="12700" rIns="12700" bIns="12700" numCol="1" spcCol="1270" anchor="ctr" anchorCtr="0">
           <a:noAutofit/>
         </a:bodyPr>
         <a:lstStyle/>
         <a:p>
-          <a:pPr marL="0" lvl="0" indent="0" algn="ctr" defTabSz="355600">
+          <a:pPr marL="0" lvl="0" indent="0" algn="ctr" defTabSz="444500">
             <a:lnSpc>
               <a:spcPct val="90000"/>
             </a:lnSpc>
@@ -7473,14 +7475,14 @@
             <a:buNone/>
           </a:pPr>
           <a:r>
-            <a:rPr lang="en-US" sz="800" kern="1200"/>
+            <a:rPr lang="en-US" sz="1000" kern="1200"/>
             <a:t>Perform Checking</a:t>
           </a:r>
-          <a:endParaRPr lang="en-US" sz="800" kern="1200" dirty="0"/>
+          <a:endParaRPr lang="en-US" sz="1000" kern="1200" dirty="0"/>
         </a:p>
       </dsp:txBody>
       <dsp:txXfrm>
-        <a:off x="1057041" y="146201"/>
+        <a:off x="1087868" y="146201"/>
         <a:ext cx="629005" cy="629005"/>
       </dsp:txXfrm>
     </dsp:sp>
@@ -7491,14 +7493,14 @@
       </dsp:nvSpPr>
       <dsp:spPr>
         <a:xfrm>
-          <a:off x="99951" y="22709"/>
+          <a:off x="130779" y="22709"/>
           <a:ext cx="1486225" cy="1486225"/>
         </a:xfrm>
         <a:prstGeom prst="circularArrow">
           <a:avLst>
             <a:gd name="adj1" fmla="val 8253"/>
             <a:gd name="adj2" fmla="val 576492"/>
-            <a:gd name="adj3" fmla="val 2962140"/>
+            <a:gd name="adj3" fmla="val 1980955"/>
             <a:gd name="adj4" fmla="val 52872"/>
             <a:gd name="adj5" fmla="val 9628"/>
           </a:avLst>
@@ -7542,8 +7544,8 @@
       </dsp:nvSpPr>
       <dsp:spPr>
         <a:xfrm>
-          <a:off x="528561" y="1061554"/>
-          <a:ext cx="629005" cy="629005"/>
+          <a:off x="424873" y="1061554"/>
+          <a:ext cx="898036" cy="629005"/>
         </a:xfrm>
         <a:prstGeom prst="rect">
           <a:avLst/>
@@ -7567,12 +7569,12 @@
         <a:fontRef idx="minor"/>
       </dsp:style>
       <dsp:txBody>
-        <a:bodyPr spcFirstLastPara="0" vert="horz" wrap="square" lIns="10160" tIns="10160" rIns="10160" bIns="10160" numCol="1" spcCol="1270" anchor="ctr" anchorCtr="0">
+        <a:bodyPr spcFirstLastPara="0" vert="horz" wrap="square" lIns="12700" tIns="12700" rIns="12700" bIns="12700" numCol="1" spcCol="1270" anchor="ctr" anchorCtr="0">
           <a:noAutofit/>
         </a:bodyPr>
         <a:lstStyle/>
         <a:p>
-          <a:pPr marL="0" lvl="0" indent="0" algn="ctr" defTabSz="355600">
+          <a:pPr marL="0" lvl="0" indent="0" algn="ctr" defTabSz="444500">
             <a:lnSpc>
               <a:spcPct val="90000"/>
             </a:lnSpc>
@@ -7585,14 +7587,14 @@
             <a:buNone/>
           </a:pPr>
           <a:r>
-            <a:rPr lang="en-US" sz="800" kern="1200" dirty="0"/>
+            <a:rPr lang="en-US" sz="1000" kern="1200" dirty="0"/>
             <a:t>receive confirmation</a:t>
           </a:r>
         </a:p>
       </dsp:txBody>
       <dsp:txXfrm>
-        <a:off x="528561" y="1061554"/>
-        <a:ext cx="629005" cy="629005"/>
+        <a:off x="424873" y="1061554"/>
+        <a:ext cx="898036" cy="629005"/>
       </dsp:txXfrm>
     </dsp:sp>
     <dsp:sp modelId="{7CD8AC59-E0CC-CF4B-9A49-FA73552BB12A}">
@@ -7602,7 +7604,7 @@
       </dsp:nvSpPr>
       <dsp:spPr>
         <a:xfrm>
-          <a:off x="99951" y="22709"/>
+          <a:off x="130779" y="22709"/>
           <a:ext cx="1486225" cy="1486225"/>
         </a:xfrm>
         <a:prstGeom prst="circularArrow">
@@ -7610,7 +7612,7 @@
             <a:gd name="adj1" fmla="val 8253"/>
             <a:gd name="adj2" fmla="val 576492"/>
             <a:gd name="adj3" fmla="val 10170636"/>
-            <a:gd name="adj4" fmla="val 7261368"/>
+            <a:gd name="adj4" fmla="val 8242553"/>
             <a:gd name="adj5" fmla="val 9628"/>
           </a:avLst>
         </a:prstGeom>
@@ -7653,8 +7655,8 @@
       </dsp:nvSpPr>
       <dsp:spPr>
         <a:xfrm>
-          <a:off x="82" y="146201"/>
-          <a:ext cx="629005" cy="629005"/>
+          <a:off x="-30744" y="146201"/>
+          <a:ext cx="752315" cy="629005"/>
         </a:xfrm>
         <a:prstGeom prst="rect">
           <a:avLst/>
@@ -7678,12 +7680,12 @@
         <a:fontRef idx="minor"/>
       </dsp:style>
       <dsp:txBody>
-        <a:bodyPr spcFirstLastPara="0" vert="horz" wrap="square" lIns="10160" tIns="10160" rIns="10160" bIns="10160" numCol="1" spcCol="1270" anchor="ctr" anchorCtr="0">
+        <a:bodyPr spcFirstLastPara="0" vert="horz" wrap="square" lIns="12700" tIns="12700" rIns="12700" bIns="12700" numCol="1" spcCol="1270" anchor="ctr" anchorCtr="0">
           <a:noAutofit/>
         </a:bodyPr>
         <a:lstStyle/>
         <a:p>
-          <a:pPr marL="0" lvl="0" indent="0" algn="ctr" defTabSz="355600">
+          <a:pPr marL="0" lvl="0" indent="0" algn="ctr" defTabSz="444500">
             <a:lnSpc>
               <a:spcPct val="90000"/>
             </a:lnSpc>
@@ -7696,14 +7698,14 @@
             <a:buNone/>
           </a:pPr>
           <a:r>
-            <a:rPr lang="en-US" sz="800" kern="1200" dirty="0"/>
+            <a:rPr lang="en-US" sz="1000" kern="1200" dirty="0"/>
             <a:t>commit transaction</a:t>
           </a:r>
         </a:p>
       </dsp:txBody>
       <dsp:txXfrm>
-        <a:off x="82" y="146201"/>
-        <a:ext cx="629005" cy="629005"/>
+        <a:off x="-30744" y="146201"/>
+        <a:ext cx="752315" cy="629005"/>
       </dsp:txXfrm>
     </dsp:sp>
     <dsp:sp modelId="{247547AA-FAF5-2845-B0F2-C4C07C948B42}">
@@ -7713,7 +7715,7 @@
       </dsp:nvSpPr>
       <dsp:spPr>
         <a:xfrm>
-          <a:off x="99951" y="22709"/>
+          <a:off x="130779" y="22709"/>
           <a:ext cx="1486225" cy="1486225"/>
         </a:xfrm>
         <a:prstGeom prst="circularArrow">
@@ -7721,7 +7723,7 @@
             <a:gd name="adj1" fmla="val 8253"/>
             <a:gd name="adj2" fmla="val 576492"/>
             <a:gd name="adj3" fmla="val 16855119"/>
-            <a:gd name="adj4" fmla="val 14968389"/>
+            <a:gd name="adj4" fmla="val 15332730"/>
             <a:gd name="adj5" fmla="val 9628"/>
           </a:avLst>
         </a:prstGeom>
@@ -19493,7 +19495,7 @@
           <a:p>
             <a:fld id="{EC13577B-6902-467D-A26C-08A0DD5E4E03}" type="datetimeFigureOut">
               <a:rPr lang="en-US" smtClean="0"/>
-              <a:t>7/28/20</a:t>
+              <a:t>8/2/20</a:t>
             </a:fld>
             <a:endParaRPr lang="en-US"/>
           </a:p>
@@ -20037,7 +20039,7 @@
             <a:fld id="{8BEEBAAA-29B5-4AF5-BC5F-7E580C29002D}" type="datetimeFigureOut">
               <a:rPr lang="en-US" smtClean="0"/>
               <a:pPr/>
-              <a:t>7/28/20</a:t>
+              <a:t>8/2/20</a:t>
             </a:fld>
             <a:endParaRPr lang="en-US"/>
           </a:p>
@@ -20497,7 +20499,7 @@
             <a:fld id="{8BEEBAAA-29B5-4AF5-BC5F-7E580C29002D}" type="datetimeFigureOut">
               <a:rPr lang="en-US" smtClean="0"/>
               <a:pPr/>
-              <a:t>7/28/20</a:t>
+              <a:t>8/2/20</a:t>
             </a:fld>
             <a:endParaRPr lang="en-US" dirty="0"/>
           </a:p>
@@ -20906,7 +20908,7 @@
           <p:nvPr>
             <p:extLst>
               <p:ext uri="{D42A27DB-BD31-4B8C-83A1-F6EECF244321}">
-                <p14:modId xmlns:p14="http://schemas.microsoft.com/office/powerpoint/2010/main" val="2762304914"/>
+                <p14:modId xmlns:p14="http://schemas.microsoft.com/office/powerpoint/2010/main" val="2695358794"/>
               </p:ext>
             </p:extLst>
           </p:nvPr>
@@ -20986,13 +20988,13 @@
           <p:nvPr>
             <p:extLst>
               <p:ext uri="{D42A27DB-BD31-4B8C-83A1-F6EECF244321}">
-                <p14:modId xmlns:p14="http://schemas.microsoft.com/office/powerpoint/2010/main" val="3367059270"/>
+                <p14:modId xmlns:p14="http://schemas.microsoft.com/office/powerpoint/2010/main" val="4271366313"/>
               </p:ext>
             </p:extLst>
           </p:nvPr>
         </p:nvGraphicFramePr>
         <p:xfrm>
-          <a:off x="695569" y="4528485"/>
+          <a:off x="8523764" y="4482059"/>
           <a:ext cx="3272472" cy="2329515"/>
         </p:xfrm>
         <a:graphic>
@@ -21015,8 +21017,8 @@
         </p:nvSpPr>
         <p:spPr>
           <a:xfrm>
-            <a:off x="-144140" y="4987079"/>
-            <a:ext cx="1558748" cy="246221"/>
+            <a:off x="6611921" y="2806238"/>
+            <a:ext cx="1558748" cy="307777"/>
           </a:xfrm>
           <a:prstGeom prst="rect">
             <a:avLst/>
@@ -21049,18 +21051,18 @@
           <a:p>
             <a:pPr algn="ctr" defTabSz="1219170" hangingPunct="0"/>
             <a:r>
-              <a:rPr lang="en-TW" sz="800" dirty="0"/>
+              <a:rPr lang="en-TW" sz="1000" dirty="0"/>
               <a:t>Emerging cases or </a:t>
             </a:r>
           </a:p>
           <a:p>
             <a:pPr algn="ctr" defTabSz="1219170" hangingPunct="0"/>
             <a:r>
-              <a:rPr lang="en-TW" sz="800" dirty="0"/>
+              <a:rPr lang="en-TW" sz="1000" dirty="0"/>
               <a:t>s</a:t>
             </a:r>
             <a:r>
-              <a:rPr lang="en-TW" sz="800" dirty="0">
+              <a:rPr lang="en-TW" sz="1000" dirty="0">
                 <a:latin typeface="+mj-lt"/>
                 <a:ea typeface="+mj-ea"/>
                 <a:cs typeface="+mj-cs"/>
@@ -21084,13 +21086,13 @@
           <p:nvPr>
             <p:extLst>
               <p:ext uri="{D42A27DB-BD31-4B8C-83A1-F6EECF244321}">
-                <p14:modId xmlns:p14="http://schemas.microsoft.com/office/powerpoint/2010/main" val="851652789"/>
+                <p14:modId xmlns:p14="http://schemas.microsoft.com/office/powerpoint/2010/main" val="1200530191"/>
               </p:ext>
             </p:extLst>
           </p:nvPr>
         </p:nvGraphicFramePr>
         <p:xfrm>
-          <a:off x="8853932" y="5102131"/>
+          <a:off x="1700746" y="5097519"/>
           <a:ext cx="1686129" cy="1714055"/>
         </p:xfrm>
         <a:graphic>
@@ -21129,7 +21131,7 @@
         </p:blipFill>
         <p:spPr bwMode="auto">
           <a:xfrm>
-            <a:off x="7750504" y="3744495"/>
+            <a:off x="2652095" y="3339074"/>
             <a:ext cx="1869629" cy="1242584"/>
           </a:xfrm>
           <a:prstGeom prst="rect">
@@ -21228,22 +21230,23 @@
           </p:cNvPr>
           <p:cNvCxnSpPr>
             <a:cxnSpLocks/>
+            <a:stCxn id="13" idx="2"/>
           </p:cNvCxnSpPr>
           <p:nvPr/>
         </p:nvCxnSpPr>
         <p:spPr>
           <a:xfrm rot="16200000" flipH="1">
-            <a:off x="595331" y="5443368"/>
-            <a:ext cx="579556" cy="499749"/>
+            <a:off x="6915531" y="3589779"/>
+            <a:ext cx="2487664" cy="1536136"/>
           </a:xfrm>
           <a:prstGeom prst="curvedConnector3">
             <a:avLst>
-              <a:gd name="adj1" fmla="val 119421"/>
+              <a:gd name="adj1" fmla="val 50000"/>
             </a:avLst>
           </a:prstGeom>
           <a:ln w="57150">
             <a:solidFill>
-              <a:srgbClr val="009CD6"/>
+              <a:srgbClr val="FF0000"/>
             </a:solidFill>
             <a:tailEnd type="triangle"/>
           </a:ln>
@@ -21407,7 +21410,7 @@
           </a:prstGeom>
           <a:ln w="57150">
             <a:solidFill>
-              <a:srgbClr val="069CD4"/>
+              <a:srgbClr val="FF0000"/>
             </a:solidFill>
             <a:tailEnd type="triangle"/>
           </a:ln>
@@ -23291,7 +23294,7 @@
         </p:blipFill>
         <p:spPr>
           <a:xfrm>
-            <a:off x="2987961" y="491972"/>
+            <a:off x="2987961" y="500937"/>
             <a:ext cx="3108039" cy="911327"/>
           </a:xfrm>
           <a:prstGeom prst="rect">
@@ -23375,6 +23378,2185 @@
     <p:extLst>
       <p:ext uri="{BB962C8B-B14F-4D97-AF65-F5344CB8AC3E}">
         <p14:creationId xmlns:p14="http://schemas.microsoft.com/office/powerpoint/2010/main" val="1984760219"/>
+      </p:ext>
+    </p:extLst>
+  </p:cSld>
+  <p:clrMapOvr>
+    <a:masterClrMapping/>
+  </p:clrMapOvr>
+  <p:transition spd="med"/>
+</p:sld>
+</file>
+
+<file path=ppt/slides/slide7.xml><?xml version="1.0" encoding="utf-8"?>
+<p:sld xmlns:a="http://schemas.openxmlformats.org/drawingml/2006/main" xmlns:r="http://schemas.openxmlformats.org/officeDocument/2006/relationships" xmlns:p="http://schemas.openxmlformats.org/presentationml/2006/main">
+  <p:cSld>
+    <p:spTree>
+      <p:nvGrpSpPr>
+        <p:cNvPr id="1" name=""/>
+        <p:cNvGrpSpPr/>
+        <p:nvPr/>
+      </p:nvGrpSpPr>
+      <p:grpSpPr>
+        <a:xfrm>
+          <a:off x="0" y="0"/>
+          <a:ext cx="0" cy="0"/>
+          <a:chOff x="0" y="0"/>
+          <a:chExt cx="0" cy="0"/>
+        </a:xfrm>
+      </p:grpSpPr>
+      <p:sp>
+        <p:nvSpPr>
+          <p:cNvPr id="80" name="Can 79">
+            <a:extLst>
+              <a:ext uri="{FF2B5EF4-FFF2-40B4-BE49-F238E27FC236}">
+                <a16:creationId xmlns:a16="http://schemas.microsoft.com/office/drawing/2014/main" id="{A6A4FC72-DD2B-FC4A-9447-70DCCD73D06C}"/>
+              </a:ext>
+            </a:extLst>
+          </p:cNvPr>
+          <p:cNvSpPr/>
+          <p:nvPr/>
+        </p:nvSpPr>
+        <p:spPr>
+          <a:xfrm>
+            <a:off x="5176892" y="4132556"/>
+            <a:ext cx="1561590" cy="1179921"/>
+          </a:xfrm>
+          <a:prstGeom prst="can">
+            <a:avLst>
+              <a:gd name="adj" fmla="val 17862"/>
+            </a:avLst>
+          </a:prstGeom>
+          <a:solidFill>
+            <a:schemeClr val="tx1">
+              <a:lumMod val="50000"/>
+              <a:lumOff val="50000"/>
+            </a:schemeClr>
+          </a:solidFill>
+        </p:spPr>
+        <p:style>
+          <a:lnRef idx="2">
+            <a:schemeClr val="accent1">
+              <a:shade val="50000"/>
+            </a:schemeClr>
+          </a:lnRef>
+          <a:fillRef idx="1">
+            <a:schemeClr val="accent1"/>
+          </a:fillRef>
+          <a:effectRef idx="0">
+            <a:schemeClr val="accent1"/>
+          </a:effectRef>
+          <a:fontRef idx="minor">
+            <a:schemeClr val="lt1"/>
+          </a:fontRef>
+        </p:style>
+        <p:txBody>
+          <a:bodyPr rtlCol="0" anchor="t"/>
+          <a:lstStyle/>
+          <a:p>
+            <a:pPr algn="ctr"/>
+            <a:r>
+              <a:rPr lang="en-TW" dirty="0"/>
+              <a:t>Namespace</a:t>
+            </a:r>
+          </a:p>
+        </p:txBody>
+      </p:sp>
+      <p:sp>
+        <p:nvSpPr>
+          <p:cNvPr id="7" name="Rectangle 6">
+            <a:extLst>
+              <a:ext uri="{FF2B5EF4-FFF2-40B4-BE49-F238E27FC236}">
+                <a16:creationId xmlns:a16="http://schemas.microsoft.com/office/drawing/2014/main" id="{6123F3AD-8711-5147-9B93-2D1F513B2131}"/>
+              </a:ext>
+            </a:extLst>
+          </p:cNvPr>
+          <p:cNvSpPr/>
+          <p:nvPr/>
+        </p:nvSpPr>
+        <p:spPr>
+          <a:xfrm>
+            <a:off x="8093327" y="469232"/>
+            <a:ext cx="2921667" cy="5919536"/>
+          </a:xfrm>
+          <a:prstGeom prst="rect">
+            <a:avLst/>
+          </a:prstGeom>
+          <a:noFill/>
+          <a:ln>
+            <a:solidFill>
+              <a:schemeClr val="tx1"/>
+            </a:solidFill>
+          </a:ln>
+        </p:spPr>
+        <p:style>
+          <a:lnRef idx="2">
+            <a:schemeClr val="accent1">
+              <a:shade val="50000"/>
+            </a:schemeClr>
+          </a:lnRef>
+          <a:fillRef idx="1">
+            <a:schemeClr val="accent1"/>
+          </a:fillRef>
+          <a:effectRef idx="0">
+            <a:schemeClr val="accent1"/>
+          </a:effectRef>
+          <a:fontRef idx="minor">
+            <a:schemeClr val="lt1"/>
+          </a:fontRef>
+        </p:style>
+        <p:txBody>
+          <a:bodyPr rtlCol="0" anchor="ctr"/>
+          <a:lstStyle/>
+          <a:p>
+            <a:pPr algn="ctr"/>
+            <a:r>
+              <a:rPr lang="en-TW" dirty="0">
+                <a:solidFill>
+                  <a:schemeClr val="tx1"/>
+                </a:solidFill>
+              </a:rPr>
+              <a:t>Destination</a:t>
+            </a:r>
+          </a:p>
+        </p:txBody>
+      </p:sp>
+      <p:sp>
+        <p:nvSpPr>
+          <p:cNvPr id="8" name="Rectangle 7">
+            <a:extLst>
+              <a:ext uri="{FF2B5EF4-FFF2-40B4-BE49-F238E27FC236}">
+                <a16:creationId xmlns:a16="http://schemas.microsoft.com/office/drawing/2014/main" id="{B9A0DA2F-B1D1-DB4B-9D16-AA81B1600FBD}"/>
+              </a:ext>
+            </a:extLst>
+          </p:cNvPr>
+          <p:cNvSpPr/>
+          <p:nvPr/>
+        </p:nvSpPr>
+        <p:spPr>
+          <a:xfrm>
+            <a:off x="871331" y="469232"/>
+            <a:ext cx="2921667" cy="5919536"/>
+          </a:xfrm>
+          <a:prstGeom prst="rect">
+            <a:avLst/>
+          </a:prstGeom>
+          <a:noFill/>
+          <a:ln>
+            <a:solidFill>
+              <a:schemeClr val="tx1"/>
+            </a:solidFill>
+          </a:ln>
+        </p:spPr>
+        <p:style>
+          <a:lnRef idx="2">
+            <a:schemeClr val="accent1">
+              <a:shade val="50000"/>
+            </a:schemeClr>
+          </a:lnRef>
+          <a:fillRef idx="1">
+            <a:schemeClr val="accent1"/>
+          </a:fillRef>
+          <a:effectRef idx="0">
+            <a:schemeClr val="accent1"/>
+          </a:effectRef>
+          <a:fontRef idx="minor">
+            <a:schemeClr val="lt1"/>
+          </a:fontRef>
+        </p:style>
+        <p:txBody>
+          <a:bodyPr rtlCol="0" anchor="ctr"/>
+          <a:lstStyle/>
+          <a:p>
+            <a:pPr algn="ctr"/>
+            <a:r>
+              <a:rPr lang="en-TW" dirty="0">
+                <a:solidFill>
+                  <a:schemeClr val="tx1"/>
+                </a:solidFill>
+              </a:rPr>
+              <a:t>Source</a:t>
+            </a:r>
+          </a:p>
+        </p:txBody>
+      </p:sp>
+      <p:sp>
+        <p:nvSpPr>
+          <p:cNvPr id="3" name="Oval 2">
+            <a:extLst>
+              <a:ext uri="{FF2B5EF4-FFF2-40B4-BE49-F238E27FC236}">
+                <a16:creationId xmlns:a16="http://schemas.microsoft.com/office/drawing/2014/main" id="{F9C555DC-EE96-FB4F-9E90-3C972D470D1D}"/>
+              </a:ext>
+            </a:extLst>
+          </p:cNvPr>
+          <p:cNvSpPr/>
+          <p:nvPr/>
+        </p:nvSpPr>
+        <p:spPr>
+          <a:xfrm>
+            <a:off x="4641747" y="2929689"/>
+            <a:ext cx="2602831" cy="998621"/>
+          </a:xfrm>
+          <a:prstGeom prst="ellipse">
+            <a:avLst/>
+          </a:prstGeom>
+          <a:noFill/>
+          <a:ln>
+            <a:solidFill>
+              <a:schemeClr val="tx1"/>
+            </a:solidFill>
+          </a:ln>
+        </p:spPr>
+        <p:style>
+          <a:lnRef idx="2">
+            <a:schemeClr val="accent1">
+              <a:shade val="50000"/>
+            </a:schemeClr>
+          </a:lnRef>
+          <a:fillRef idx="1">
+            <a:schemeClr val="accent1"/>
+          </a:fillRef>
+          <a:effectRef idx="0">
+            <a:schemeClr val="accent1"/>
+          </a:effectRef>
+          <a:fontRef idx="minor">
+            <a:schemeClr val="lt1"/>
+          </a:fontRef>
+        </p:style>
+        <p:txBody>
+          <a:bodyPr rtlCol="0" anchor="ctr"/>
+          <a:lstStyle/>
+          <a:p>
+            <a:pPr algn="ctr"/>
+            <a:r>
+              <a:rPr lang="en-TW" dirty="0">
+                <a:solidFill>
+                  <a:schemeClr val="tx1"/>
+                </a:solidFill>
+              </a:rPr>
+              <a:t>Public Communication Channel</a:t>
+            </a:r>
+          </a:p>
+        </p:txBody>
+      </p:sp>
+      <p:cxnSp>
+        <p:nvCxnSpPr>
+          <p:cNvPr id="5" name="Straight Arrow Connector 4">
+            <a:extLst>
+              <a:ext uri="{FF2B5EF4-FFF2-40B4-BE49-F238E27FC236}">
+                <a16:creationId xmlns:a16="http://schemas.microsoft.com/office/drawing/2014/main" id="{B5520ECB-527B-1B4D-9CCA-747B3E26F9A7}"/>
+              </a:ext>
+            </a:extLst>
+          </p:cNvPr>
+          <p:cNvCxnSpPr>
+            <a:cxnSpLocks/>
+            <a:stCxn id="8" idx="3"/>
+            <a:endCxn id="3" idx="2"/>
+          </p:cNvCxnSpPr>
+          <p:nvPr/>
+        </p:nvCxnSpPr>
+        <p:spPr>
+          <a:xfrm>
+            <a:off x="3792998" y="3429000"/>
+            <a:ext cx="848749" cy="0"/>
+          </a:xfrm>
+          <a:prstGeom prst="straightConnector1">
+            <a:avLst/>
+          </a:prstGeom>
+          <a:ln w="127000">
+            <a:solidFill>
+              <a:schemeClr val="tx1"/>
+            </a:solidFill>
+            <a:tailEnd type="triangle"/>
+          </a:ln>
+        </p:spPr>
+        <p:style>
+          <a:lnRef idx="1">
+            <a:schemeClr val="accent1"/>
+          </a:lnRef>
+          <a:fillRef idx="0">
+            <a:schemeClr val="accent1"/>
+          </a:fillRef>
+          <a:effectRef idx="0">
+            <a:schemeClr val="accent1"/>
+          </a:effectRef>
+          <a:fontRef idx="minor">
+            <a:schemeClr val="tx1"/>
+          </a:fontRef>
+        </p:style>
+      </p:cxnSp>
+      <p:cxnSp>
+        <p:nvCxnSpPr>
+          <p:cNvPr id="12" name="Straight Arrow Connector 11">
+            <a:extLst>
+              <a:ext uri="{FF2B5EF4-FFF2-40B4-BE49-F238E27FC236}">
+                <a16:creationId xmlns:a16="http://schemas.microsoft.com/office/drawing/2014/main" id="{4FB37B52-B73B-B644-A570-F342EAE24744}"/>
+              </a:ext>
+            </a:extLst>
+          </p:cNvPr>
+          <p:cNvCxnSpPr>
+            <a:cxnSpLocks/>
+            <a:stCxn id="3" idx="6"/>
+            <a:endCxn id="7" idx="1"/>
+          </p:cNvCxnSpPr>
+          <p:nvPr/>
+        </p:nvCxnSpPr>
+        <p:spPr>
+          <a:xfrm>
+            <a:off x="7244578" y="3429000"/>
+            <a:ext cx="848749" cy="0"/>
+          </a:xfrm>
+          <a:prstGeom prst="straightConnector1">
+            <a:avLst/>
+          </a:prstGeom>
+          <a:ln w="127000">
+            <a:solidFill>
+              <a:schemeClr val="tx1"/>
+            </a:solidFill>
+            <a:tailEnd type="triangle"/>
+          </a:ln>
+        </p:spPr>
+        <p:style>
+          <a:lnRef idx="1">
+            <a:schemeClr val="accent1"/>
+          </a:lnRef>
+          <a:fillRef idx="0">
+            <a:schemeClr val="accent1"/>
+          </a:fillRef>
+          <a:effectRef idx="0">
+            <a:schemeClr val="accent1"/>
+          </a:effectRef>
+          <a:fontRef idx="minor">
+            <a:schemeClr val="tx1"/>
+          </a:fontRef>
+        </p:style>
+      </p:cxnSp>
+      <p:grpSp>
+        <p:nvGrpSpPr>
+          <p:cNvPr id="46" name="Group 45">
+            <a:extLst>
+              <a:ext uri="{FF2B5EF4-FFF2-40B4-BE49-F238E27FC236}">
+                <a16:creationId xmlns:a16="http://schemas.microsoft.com/office/drawing/2014/main" id="{5DC60C34-C4E0-814B-B353-4613F024F7CF}"/>
+              </a:ext>
+            </a:extLst>
+          </p:cNvPr>
+          <p:cNvGrpSpPr/>
+          <p:nvPr/>
+        </p:nvGrpSpPr>
+        <p:grpSpPr>
+          <a:xfrm>
+            <a:off x="1039773" y="1524972"/>
+            <a:ext cx="2658979" cy="1686508"/>
+            <a:chOff x="1087041" y="1455812"/>
+            <a:chExt cx="1693446" cy="1350695"/>
+          </a:xfrm>
+        </p:grpSpPr>
+        <p:sp>
+          <p:nvSpPr>
+            <p:cNvPr id="13" name="Rounded Rectangle 12">
+              <a:extLst>
+                <a:ext uri="{FF2B5EF4-FFF2-40B4-BE49-F238E27FC236}">
+                  <a16:creationId xmlns:a16="http://schemas.microsoft.com/office/drawing/2014/main" id="{4E1D55F5-74BD-D546-947E-0CE95EEF5FF8}"/>
+                </a:ext>
+              </a:extLst>
+            </p:cNvPr>
+            <p:cNvSpPr/>
+            <p:nvPr/>
+          </p:nvSpPr>
+          <p:spPr>
+            <a:xfrm>
+              <a:off x="1087041" y="1455812"/>
+              <a:ext cx="1693446" cy="1350695"/>
+            </a:xfrm>
+            <a:prstGeom prst="roundRect">
+              <a:avLst/>
+            </a:prstGeom>
+            <a:solidFill>
+              <a:srgbClr val="FF0000"/>
+            </a:solidFill>
+          </p:spPr>
+          <p:style>
+            <a:lnRef idx="2">
+              <a:schemeClr val="accent1">
+                <a:shade val="50000"/>
+              </a:schemeClr>
+            </a:lnRef>
+            <a:fillRef idx="1">
+              <a:schemeClr val="accent1"/>
+            </a:fillRef>
+            <a:effectRef idx="0">
+              <a:schemeClr val="accent1"/>
+            </a:effectRef>
+            <a:fontRef idx="minor">
+              <a:schemeClr val="lt1"/>
+            </a:fontRef>
+          </p:style>
+          <p:txBody>
+            <a:bodyPr rtlCol="0" anchor="t"/>
+            <a:lstStyle/>
+            <a:p>
+              <a:r>
+                <a:rPr lang="en-TW" sz="1200" dirty="0"/>
+                <a:t>Encrypted </a:t>
+              </a:r>
+            </a:p>
+            <a:p>
+              <a:r>
+                <a:rPr lang="en-US" sz="1200" dirty="0"/>
+                <a:t>            b</a:t>
+              </a:r>
+              <a:r>
+                <a:rPr lang="en-TW" sz="1200" dirty="0"/>
+                <a:t>y</a:t>
+              </a:r>
+            </a:p>
+          </p:txBody>
+        </p:sp>
+        <p:sp>
+          <p:nvSpPr>
+            <p:cNvPr id="14" name="Document 13">
+              <a:extLst>
+                <a:ext uri="{FF2B5EF4-FFF2-40B4-BE49-F238E27FC236}">
+                  <a16:creationId xmlns:a16="http://schemas.microsoft.com/office/drawing/2014/main" id="{8AA46A39-B76A-8242-A93A-54D9CAA82A05}"/>
+                </a:ext>
+              </a:extLst>
+            </p:cNvPr>
+            <p:cNvSpPr/>
+            <p:nvPr/>
+          </p:nvSpPr>
+          <p:spPr>
+            <a:xfrm>
+              <a:off x="1165026" y="2121176"/>
+              <a:ext cx="1519341" cy="628173"/>
+            </a:xfrm>
+            <a:prstGeom prst="flowChartDocument">
+              <a:avLst/>
+            </a:prstGeom>
+          </p:spPr>
+          <p:style>
+            <a:lnRef idx="2">
+              <a:schemeClr val="accent1">
+                <a:shade val="50000"/>
+              </a:schemeClr>
+            </a:lnRef>
+            <a:fillRef idx="1">
+              <a:schemeClr val="accent1"/>
+            </a:fillRef>
+            <a:effectRef idx="0">
+              <a:schemeClr val="accent1"/>
+            </a:effectRef>
+            <a:fontRef idx="minor">
+              <a:schemeClr val="lt1"/>
+            </a:fontRef>
+          </p:style>
+          <p:txBody>
+            <a:bodyPr rtlCol="0" anchor="ctr"/>
+            <a:lstStyle/>
+            <a:p>
+              <a:pPr algn="ctr"/>
+              <a:r>
+                <a:rPr lang="en-TW" sz="1200" dirty="0"/>
+                <a:t>Original Data Content</a:t>
+              </a:r>
+            </a:p>
+          </p:txBody>
+        </p:sp>
+      </p:grpSp>
+      <p:sp>
+        <p:nvSpPr>
+          <p:cNvPr id="15" name="Oval 14">
+            <a:extLst>
+              <a:ext uri="{FF2B5EF4-FFF2-40B4-BE49-F238E27FC236}">
+                <a16:creationId xmlns:a16="http://schemas.microsoft.com/office/drawing/2014/main" id="{183530CB-893A-384A-877A-AE0BDD256388}"/>
+              </a:ext>
+            </a:extLst>
+          </p:cNvPr>
+          <p:cNvSpPr/>
+          <p:nvPr/>
+        </p:nvSpPr>
+        <p:spPr>
+          <a:xfrm>
+            <a:off x="1866904" y="550870"/>
+            <a:ext cx="864000" cy="864000"/>
+          </a:xfrm>
+          <a:prstGeom prst="ellipse">
+            <a:avLst/>
+          </a:prstGeom>
+        </p:spPr>
+        <p:style>
+          <a:lnRef idx="2">
+            <a:schemeClr val="accent1">
+              <a:shade val="50000"/>
+            </a:schemeClr>
+          </a:lnRef>
+          <a:fillRef idx="1">
+            <a:schemeClr val="accent1"/>
+          </a:fillRef>
+          <a:effectRef idx="0">
+            <a:schemeClr val="accent1"/>
+          </a:effectRef>
+          <a:fontRef idx="minor">
+            <a:schemeClr val="lt1"/>
+          </a:fontRef>
+        </p:style>
+        <p:txBody>
+          <a:bodyPr rtlCol="0" anchor="ctr"/>
+          <a:lstStyle/>
+          <a:p>
+            <a:pPr algn="ctr"/>
+            <a:r>
+              <a:rPr lang="en-TW" sz="1000" dirty="0"/>
+              <a:t>Pass Phrase</a:t>
+            </a:r>
+          </a:p>
+        </p:txBody>
+      </p:sp>
+      <p:sp>
+        <p:nvSpPr>
+          <p:cNvPr id="18" name="Rounded Rectangle 17">
+            <a:extLst>
+              <a:ext uri="{FF2B5EF4-FFF2-40B4-BE49-F238E27FC236}">
+                <a16:creationId xmlns:a16="http://schemas.microsoft.com/office/drawing/2014/main" id="{9B54E6F3-1604-EA46-9E64-E0271A2CEB0A}"/>
+              </a:ext>
+            </a:extLst>
+          </p:cNvPr>
+          <p:cNvSpPr/>
+          <p:nvPr/>
+        </p:nvSpPr>
+        <p:spPr>
+          <a:xfrm>
+            <a:off x="1039773" y="4032596"/>
+            <a:ext cx="2658978" cy="1686508"/>
+          </a:xfrm>
+          <a:prstGeom prst="roundRect">
+            <a:avLst/>
+          </a:prstGeom>
+          <a:solidFill>
+            <a:srgbClr val="FF0000"/>
+          </a:solidFill>
+        </p:spPr>
+        <p:style>
+          <a:lnRef idx="2">
+            <a:schemeClr val="accent1">
+              <a:shade val="50000"/>
+            </a:schemeClr>
+          </a:lnRef>
+          <a:fillRef idx="1">
+            <a:schemeClr val="accent1"/>
+          </a:fillRef>
+          <a:effectRef idx="0">
+            <a:schemeClr val="accent1"/>
+          </a:effectRef>
+          <a:fontRef idx="minor">
+            <a:schemeClr val="lt1"/>
+          </a:fontRef>
+        </p:style>
+        <p:txBody>
+          <a:bodyPr rtlCol="0" anchor="t"/>
+          <a:lstStyle/>
+          <a:p>
+            <a:pPr algn="ctr"/>
+            <a:r>
+              <a:rPr lang="en-TW" sz="1200" dirty="0"/>
+              <a:t>Encrypted</a:t>
+            </a:r>
+          </a:p>
+          <a:p>
+            <a:pPr algn="ctr"/>
+            <a:r>
+              <a:rPr lang="en-US" sz="1200" dirty="0"/>
+              <a:t>b</a:t>
+            </a:r>
+            <a:r>
+              <a:rPr lang="en-TW" sz="1200" dirty="0"/>
+              <a:t>y Public</a:t>
+            </a:r>
+            <a:r>
+              <a:rPr lang="zh-TW" altLang="en-US" sz="1200" dirty="0"/>
+              <a:t> </a:t>
+            </a:r>
+            <a:r>
+              <a:rPr lang="en-US" altLang="zh-TW" sz="1200" dirty="0"/>
+              <a:t>Key</a:t>
+            </a:r>
+            <a:endParaRPr lang="en-TW" sz="1200" dirty="0"/>
+          </a:p>
+        </p:txBody>
+      </p:sp>
+      <p:sp>
+        <p:nvSpPr>
+          <p:cNvPr id="19" name="Document 18">
+            <a:extLst>
+              <a:ext uri="{FF2B5EF4-FFF2-40B4-BE49-F238E27FC236}">
+                <a16:creationId xmlns:a16="http://schemas.microsoft.com/office/drawing/2014/main" id="{3183A948-BB97-6D48-8D26-0A3C69FB9EDA}"/>
+              </a:ext>
+            </a:extLst>
+          </p:cNvPr>
+          <p:cNvSpPr/>
+          <p:nvPr/>
+        </p:nvSpPr>
+        <p:spPr>
+          <a:xfrm>
+            <a:off x="1139360" y="4622826"/>
+            <a:ext cx="2385607" cy="987226"/>
+          </a:xfrm>
+          <a:prstGeom prst="flowChartDocument">
+            <a:avLst/>
+          </a:prstGeom>
+        </p:spPr>
+        <p:style>
+          <a:lnRef idx="2">
+            <a:schemeClr val="accent1">
+              <a:shade val="50000"/>
+            </a:schemeClr>
+          </a:lnRef>
+          <a:fillRef idx="1">
+            <a:schemeClr val="accent1"/>
+          </a:fillRef>
+          <a:effectRef idx="0">
+            <a:schemeClr val="accent1"/>
+          </a:effectRef>
+          <a:fontRef idx="minor">
+            <a:schemeClr val="lt1"/>
+          </a:fontRef>
+        </p:style>
+        <p:txBody>
+          <a:bodyPr rtlCol="0" anchor="ctr"/>
+          <a:lstStyle/>
+          <a:p>
+            <a:pPr algn="ctr"/>
+            <a:r>
+              <a:rPr lang="en-TW" sz="1200" dirty="0"/>
+              <a:t>Original Data Content</a:t>
+            </a:r>
+          </a:p>
+        </p:txBody>
+      </p:sp>
+      <p:sp>
+        <p:nvSpPr>
+          <p:cNvPr id="25" name="Oval 24">
+            <a:extLst>
+              <a:ext uri="{FF2B5EF4-FFF2-40B4-BE49-F238E27FC236}">
+                <a16:creationId xmlns:a16="http://schemas.microsoft.com/office/drawing/2014/main" id="{2A954228-4FCB-734C-AD51-181714651A25}"/>
+              </a:ext>
+            </a:extLst>
+          </p:cNvPr>
+          <p:cNvSpPr/>
+          <p:nvPr/>
+        </p:nvSpPr>
+        <p:spPr>
+          <a:xfrm>
+            <a:off x="4641747" y="483826"/>
+            <a:ext cx="2602831" cy="998621"/>
+          </a:xfrm>
+          <a:prstGeom prst="ellipse">
+            <a:avLst/>
+          </a:prstGeom>
+          <a:noFill/>
+          <a:ln>
+            <a:solidFill>
+              <a:schemeClr val="tx1"/>
+            </a:solidFill>
+          </a:ln>
+        </p:spPr>
+        <p:style>
+          <a:lnRef idx="2">
+            <a:schemeClr val="accent1">
+              <a:shade val="50000"/>
+            </a:schemeClr>
+          </a:lnRef>
+          <a:fillRef idx="1">
+            <a:schemeClr val="accent1"/>
+          </a:fillRef>
+          <a:effectRef idx="0">
+            <a:schemeClr val="accent1"/>
+          </a:effectRef>
+          <a:fontRef idx="minor">
+            <a:schemeClr val="lt1"/>
+          </a:fontRef>
+        </p:style>
+        <p:txBody>
+          <a:bodyPr rtlCol="0" anchor="ctr"/>
+          <a:lstStyle/>
+          <a:p>
+            <a:pPr algn="ctr"/>
+            <a:r>
+              <a:rPr lang="en-TW" dirty="0">
+                <a:solidFill>
+                  <a:schemeClr val="tx1"/>
+                </a:solidFill>
+              </a:rPr>
+              <a:t>Private Communication Channel</a:t>
+            </a:r>
+          </a:p>
+        </p:txBody>
+      </p:sp>
+      <p:cxnSp>
+        <p:nvCxnSpPr>
+          <p:cNvPr id="27" name="Straight Arrow Connector 26">
+            <a:extLst>
+              <a:ext uri="{FF2B5EF4-FFF2-40B4-BE49-F238E27FC236}">
+                <a16:creationId xmlns:a16="http://schemas.microsoft.com/office/drawing/2014/main" id="{E0943C04-98A4-3342-B216-F93294D5C954}"/>
+              </a:ext>
+            </a:extLst>
+          </p:cNvPr>
+          <p:cNvCxnSpPr>
+            <a:cxnSpLocks/>
+            <a:stCxn id="25" idx="6"/>
+          </p:cNvCxnSpPr>
+          <p:nvPr/>
+        </p:nvCxnSpPr>
+        <p:spPr>
+          <a:xfrm>
+            <a:off x="7244578" y="983137"/>
+            <a:ext cx="848749" cy="0"/>
+          </a:xfrm>
+          <a:prstGeom prst="straightConnector1">
+            <a:avLst/>
+          </a:prstGeom>
+          <a:ln w="38100">
+            <a:solidFill>
+              <a:schemeClr val="tx1"/>
+            </a:solidFill>
+            <a:prstDash val="sysDash"/>
+            <a:tailEnd type="triangle"/>
+          </a:ln>
+        </p:spPr>
+        <p:style>
+          <a:lnRef idx="1">
+            <a:schemeClr val="accent1"/>
+          </a:lnRef>
+          <a:fillRef idx="0">
+            <a:schemeClr val="accent1"/>
+          </a:fillRef>
+          <a:effectRef idx="0">
+            <a:schemeClr val="accent1"/>
+          </a:effectRef>
+          <a:fontRef idx="minor">
+            <a:schemeClr val="tx1"/>
+          </a:fontRef>
+        </p:style>
+      </p:cxnSp>
+      <p:cxnSp>
+        <p:nvCxnSpPr>
+          <p:cNvPr id="28" name="Straight Arrow Connector 27">
+            <a:extLst>
+              <a:ext uri="{FF2B5EF4-FFF2-40B4-BE49-F238E27FC236}">
+                <a16:creationId xmlns:a16="http://schemas.microsoft.com/office/drawing/2014/main" id="{869D74BB-2994-E647-B155-441179C2E5D5}"/>
+              </a:ext>
+            </a:extLst>
+          </p:cNvPr>
+          <p:cNvCxnSpPr>
+            <a:cxnSpLocks/>
+            <a:stCxn id="15" idx="6"/>
+            <a:endCxn id="25" idx="2"/>
+          </p:cNvCxnSpPr>
+          <p:nvPr/>
+        </p:nvCxnSpPr>
+        <p:spPr>
+          <a:xfrm>
+            <a:off x="2730904" y="982870"/>
+            <a:ext cx="1910843" cy="267"/>
+          </a:xfrm>
+          <a:prstGeom prst="straightConnector1">
+            <a:avLst/>
+          </a:prstGeom>
+          <a:ln w="38100">
+            <a:solidFill>
+              <a:schemeClr val="tx1"/>
+            </a:solidFill>
+            <a:prstDash val="sysDash"/>
+            <a:tailEnd type="triangle"/>
+          </a:ln>
+        </p:spPr>
+        <p:style>
+          <a:lnRef idx="1">
+            <a:schemeClr val="accent1"/>
+          </a:lnRef>
+          <a:fillRef idx="0">
+            <a:schemeClr val="accent1"/>
+          </a:fillRef>
+          <a:effectRef idx="0">
+            <a:schemeClr val="accent1"/>
+          </a:effectRef>
+          <a:fontRef idx="minor">
+            <a:schemeClr val="tx1"/>
+          </a:fontRef>
+        </p:style>
+      </p:cxnSp>
+      <p:grpSp>
+        <p:nvGrpSpPr>
+          <p:cNvPr id="51" name="Group 50">
+            <a:extLst>
+              <a:ext uri="{FF2B5EF4-FFF2-40B4-BE49-F238E27FC236}">
+                <a16:creationId xmlns:a16="http://schemas.microsoft.com/office/drawing/2014/main" id="{B4582FC5-9B0E-E541-9900-AF4C2ECF9B37}"/>
+              </a:ext>
+            </a:extLst>
+          </p:cNvPr>
+          <p:cNvGrpSpPr/>
+          <p:nvPr/>
+        </p:nvGrpSpPr>
+        <p:grpSpPr>
+          <a:xfrm>
+            <a:off x="9145231" y="5363294"/>
+            <a:ext cx="837089" cy="720000"/>
+            <a:chOff x="6670286" y="4620126"/>
+            <a:chExt cx="837089" cy="720000"/>
+          </a:xfrm>
+        </p:grpSpPr>
+        <p:sp>
+          <p:nvSpPr>
+            <p:cNvPr id="45" name="Chord 44">
+              <a:extLst>
+                <a:ext uri="{FF2B5EF4-FFF2-40B4-BE49-F238E27FC236}">
+                  <a16:creationId xmlns:a16="http://schemas.microsoft.com/office/drawing/2014/main" id="{D408C3AC-FCD5-0249-AAB4-4B35068313A0}"/>
+                </a:ext>
+              </a:extLst>
+            </p:cNvPr>
+            <p:cNvSpPr/>
+            <p:nvPr/>
+          </p:nvSpPr>
+          <p:spPr>
+            <a:xfrm>
+              <a:off x="6713621" y="4620126"/>
+              <a:ext cx="720000" cy="720000"/>
+            </a:xfrm>
+            <a:prstGeom prst="chord">
+              <a:avLst>
+                <a:gd name="adj1" fmla="val 21497166"/>
+                <a:gd name="adj2" fmla="val 10905797"/>
+              </a:avLst>
+            </a:prstGeom>
+            <a:solidFill>
+              <a:srgbClr val="FF0000"/>
+            </a:solidFill>
+          </p:spPr>
+          <p:style>
+            <a:lnRef idx="2">
+              <a:schemeClr val="accent1">
+                <a:shade val="50000"/>
+              </a:schemeClr>
+            </a:lnRef>
+            <a:fillRef idx="1">
+              <a:schemeClr val="accent1"/>
+            </a:fillRef>
+            <a:effectRef idx="0">
+              <a:schemeClr val="accent1"/>
+            </a:effectRef>
+            <a:fontRef idx="minor">
+              <a:schemeClr val="lt1"/>
+            </a:fontRef>
+          </p:style>
+          <p:txBody>
+            <a:bodyPr rtlCol="0" anchor="b"/>
+            <a:lstStyle/>
+            <a:p>
+              <a:pPr algn="ctr"/>
+              <a:endParaRPr lang="en-TW" sz="800" dirty="0"/>
+            </a:p>
+          </p:txBody>
+        </p:sp>
+        <p:sp>
+          <p:nvSpPr>
+            <p:cNvPr id="50" name="TextBox 49">
+              <a:extLst>
+                <a:ext uri="{FF2B5EF4-FFF2-40B4-BE49-F238E27FC236}">
+                  <a16:creationId xmlns:a16="http://schemas.microsoft.com/office/drawing/2014/main" id="{08F9CBA2-327F-F847-8A68-5268A38D9DCD}"/>
+                </a:ext>
+              </a:extLst>
+            </p:cNvPr>
+            <p:cNvSpPr txBox="1"/>
+            <p:nvPr/>
+          </p:nvSpPr>
+          <p:spPr>
+            <a:xfrm>
+              <a:off x="6670286" y="4950273"/>
+              <a:ext cx="837089" cy="246221"/>
+            </a:xfrm>
+            <a:prstGeom prst="rect">
+              <a:avLst/>
+            </a:prstGeom>
+            <a:noFill/>
+          </p:spPr>
+          <p:txBody>
+            <a:bodyPr wrap="none" rtlCol="0">
+              <a:spAutoFit/>
+            </a:bodyPr>
+            <a:lstStyle/>
+            <a:p>
+              <a:r>
+                <a:rPr lang="en-TW" sz="1000" dirty="0">
+                  <a:solidFill>
+                    <a:schemeClr val="bg1"/>
+                  </a:solidFill>
+                </a:rPr>
+                <a:t>Private Key</a:t>
+              </a:r>
+            </a:p>
+          </p:txBody>
+        </p:sp>
+      </p:grpSp>
+      <p:grpSp>
+        <p:nvGrpSpPr>
+          <p:cNvPr id="54" name="Group 53">
+            <a:extLst>
+              <a:ext uri="{FF2B5EF4-FFF2-40B4-BE49-F238E27FC236}">
+                <a16:creationId xmlns:a16="http://schemas.microsoft.com/office/drawing/2014/main" id="{305536EC-65CB-304F-B516-CAA72F95D8A0}"/>
+              </a:ext>
+            </a:extLst>
+          </p:cNvPr>
+          <p:cNvGrpSpPr/>
+          <p:nvPr/>
+        </p:nvGrpSpPr>
+        <p:grpSpPr>
+          <a:xfrm>
+            <a:off x="1967432" y="3682268"/>
+            <a:ext cx="758541" cy="720000"/>
+            <a:chOff x="6725431" y="4309124"/>
+            <a:chExt cx="758541" cy="720000"/>
+          </a:xfrm>
+        </p:grpSpPr>
+        <p:sp>
+          <p:nvSpPr>
+            <p:cNvPr id="52" name="Chord 51">
+              <a:extLst>
+                <a:ext uri="{FF2B5EF4-FFF2-40B4-BE49-F238E27FC236}">
+                  <a16:creationId xmlns:a16="http://schemas.microsoft.com/office/drawing/2014/main" id="{5CF0DD93-1E11-7647-A215-8E5939861391}"/>
+                </a:ext>
+              </a:extLst>
+            </p:cNvPr>
+            <p:cNvSpPr/>
+            <p:nvPr/>
+          </p:nvSpPr>
+          <p:spPr>
+            <a:xfrm>
+              <a:off x="6736419" y="4309124"/>
+              <a:ext cx="720000" cy="720000"/>
+            </a:xfrm>
+            <a:prstGeom prst="chord">
+              <a:avLst>
+                <a:gd name="adj1" fmla="val 10898648"/>
+                <a:gd name="adj2" fmla="val 21443894"/>
+              </a:avLst>
+            </a:prstGeom>
+          </p:spPr>
+          <p:style>
+            <a:lnRef idx="2">
+              <a:schemeClr val="accent1">
+                <a:shade val="50000"/>
+              </a:schemeClr>
+            </a:lnRef>
+            <a:fillRef idx="1">
+              <a:schemeClr val="accent1"/>
+            </a:fillRef>
+            <a:effectRef idx="0">
+              <a:schemeClr val="accent1"/>
+            </a:effectRef>
+            <a:fontRef idx="minor">
+              <a:schemeClr val="lt1"/>
+            </a:fontRef>
+          </p:style>
+          <p:txBody>
+            <a:bodyPr rtlCol="0" anchor="ctr"/>
+            <a:lstStyle/>
+            <a:p>
+              <a:pPr algn="ctr"/>
+              <a:endParaRPr lang="en-TW"/>
+            </a:p>
+          </p:txBody>
+        </p:sp>
+        <p:sp>
+          <p:nvSpPr>
+            <p:cNvPr id="53" name="TextBox 52">
+              <a:extLst>
+                <a:ext uri="{FF2B5EF4-FFF2-40B4-BE49-F238E27FC236}">
+                  <a16:creationId xmlns:a16="http://schemas.microsoft.com/office/drawing/2014/main" id="{320B484A-6E78-DD4E-BA77-AED32F15FB6F}"/>
+                </a:ext>
+              </a:extLst>
+            </p:cNvPr>
+            <p:cNvSpPr txBox="1"/>
+            <p:nvPr/>
+          </p:nvSpPr>
+          <p:spPr>
+            <a:xfrm>
+              <a:off x="6725431" y="4438894"/>
+              <a:ext cx="758541" cy="246221"/>
+            </a:xfrm>
+            <a:prstGeom prst="rect">
+              <a:avLst/>
+            </a:prstGeom>
+            <a:noFill/>
+          </p:spPr>
+          <p:txBody>
+            <a:bodyPr wrap="none" rtlCol="0">
+              <a:spAutoFit/>
+            </a:bodyPr>
+            <a:lstStyle/>
+            <a:p>
+              <a:r>
+                <a:rPr lang="en-TW" sz="1000" dirty="0">
+                  <a:solidFill>
+                    <a:schemeClr val="bg1"/>
+                  </a:solidFill>
+                </a:rPr>
+                <a:t>Pubic Key</a:t>
+              </a:r>
+            </a:p>
+          </p:txBody>
+        </p:sp>
+      </p:grpSp>
+      <p:sp>
+        <p:nvSpPr>
+          <p:cNvPr id="55" name="Oval 54">
+            <a:extLst>
+              <a:ext uri="{FF2B5EF4-FFF2-40B4-BE49-F238E27FC236}">
+                <a16:creationId xmlns:a16="http://schemas.microsoft.com/office/drawing/2014/main" id="{30A21603-F231-2E4B-B4FE-CA7E529EC052}"/>
+              </a:ext>
+            </a:extLst>
+          </p:cNvPr>
+          <p:cNvSpPr/>
+          <p:nvPr/>
+        </p:nvSpPr>
+        <p:spPr>
+          <a:xfrm>
+            <a:off x="1904838" y="1506069"/>
+            <a:ext cx="827999" cy="827999"/>
+          </a:xfrm>
+          <a:prstGeom prst="ellipse">
+            <a:avLst/>
+          </a:prstGeom>
+          <a:solidFill>
+            <a:schemeClr val="bg1"/>
+          </a:solidFill>
+        </p:spPr>
+        <p:style>
+          <a:lnRef idx="2">
+            <a:schemeClr val="accent1">
+              <a:shade val="50000"/>
+            </a:schemeClr>
+          </a:lnRef>
+          <a:fillRef idx="1">
+            <a:schemeClr val="accent1"/>
+          </a:fillRef>
+          <a:effectRef idx="0">
+            <a:schemeClr val="accent1"/>
+          </a:effectRef>
+          <a:fontRef idx="minor">
+            <a:schemeClr val="lt1"/>
+          </a:fontRef>
+        </p:style>
+        <p:txBody>
+          <a:bodyPr rtlCol="0" anchor="ctr"/>
+          <a:lstStyle/>
+          <a:p>
+            <a:pPr algn="ctr"/>
+            <a:r>
+              <a:rPr lang="en-TW" sz="1000" dirty="0">
+                <a:solidFill>
+                  <a:schemeClr val="tx1"/>
+                </a:solidFill>
+              </a:rPr>
+              <a:t>Pass Phrase</a:t>
+            </a:r>
+          </a:p>
+        </p:txBody>
+      </p:sp>
+      <p:sp>
+        <p:nvSpPr>
+          <p:cNvPr id="56" name="Rounded Rectangle 55">
+            <a:extLst>
+              <a:ext uri="{FF2B5EF4-FFF2-40B4-BE49-F238E27FC236}">
+                <a16:creationId xmlns:a16="http://schemas.microsoft.com/office/drawing/2014/main" id="{535D0D24-4A6F-4B4F-8660-1CC7C351357E}"/>
+              </a:ext>
+            </a:extLst>
+          </p:cNvPr>
+          <p:cNvSpPr/>
+          <p:nvPr/>
+        </p:nvSpPr>
+        <p:spPr>
+          <a:xfrm>
+            <a:off x="8206584" y="4032596"/>
+            <a:ext cx="2658978" cy="1686508"/>
+          </a:xfrm>
+          <a:prstGeom prst="roundRect">
+            <a:avLst/>
+          </a:prstGeom>
+          <a:solidFill>
+            <a:srgbClr val="FF0000">
+              <a:alpha val="50000"/>
+            </a:srgbClr>
+          </a:solidFill>
+        </p:spPr>
+        <p:style>
+          <a:lnRef idx="2">
+            <a:schemeClr val="accent1">
+              <a:shade val="50000"/>
+            </a:schemeClr>
+          </a:lnRef>
+          <a:fillRef idx="1">
+            <a:schemeClr val="accent1"/>
+          </a:fillRef>
+          <a:effectRef idx="0">
+            <a:schemeClr val="accent1"/>
+          </a:effectRef>
+          <a:fontRef idx="minor">
+            <a:schemeClr val="lt1"/>
+          </a:fontRef>
+        </p:style>
+        <p:txBody>
+          <a:bodyPr rtlCol="0" anchor="t"/>
+          <a:lstStyle/>
+          <a:p>
+            <a:pPr algn="ctr"/>
+            <a:r>
+              <a:rPr lang="en-TW" sz="1200" dirty="0">
+                <a:solidFill>
+                  <a:schemeClr val="tx1"/>
+                </a:solidFill>
+              </a:rPr>
+              <a:t>Decrypted</a:t>
+            </a:r>
+          </a:p>
+          <a:p>
+            <a:pPr algn="ctr"/>
+            <a:r>
+              <a:rPr lang="en-US" sz="1200" dirty="0">
+                <a:solidFill>
+                  <a:schemeClr val="tx1"/>
+                </a:solidFill>
+              </a:rPr>
+              <a:t>b</a:t>
+            </a:r>
+            <a:r>
+              <a:rPr lang="en-TW" sz="1200" dirty="0">
+                <a:solidFill>
+                  <a:schemeClr val="tx1"/>
+                </a:solidFill>
+              </a:rPr>
+              <a:t>y Private</a:t>
+            </a:r>
+            <a:r>
+              <a:rPr lang="zh-TW" altLang="en-US" sz="1200" dirty="0">
+                <a:solidFill>
+                  <a:schemeClr val="tx1"/>
+                </a:solidFill>
+              </a:rPr>
+              <a:t> </a:t>
+            </a:r>
+            <a:r>
+              <a:rPr lang="en-US" altLang="zh-TW" sz="1200" dirty="0">
+                <a:solidFill>
+                  <a:schemeClr val="tx1"/>
+                </a:solidFill>
+              </a:rPr>
+              <a:t>Key</a:t>
+            </a:r>
+            <a:endParaRPr lang="en-TW" sz="1200" dirty="0">
+              <a:solidFill>
+                <a:schemeClr val="tx1"/>
+              </a:solidFill>
+            </a:endParaRPr>
+          </a:p>
+        </p:txBody>
+      </p:sp>
+      <p:sp>
+        <p:nvSpPr>
+          <p:cNvPr id="57" name="Document 56">
+            <a:extLst>
+              <a:ext uri="{FF2B5EF4-FFF2-40B4-BE49-F238E27FC236}">
+                <a16:creationId xmlns:a16="http://schemas.microsoft.com/office/drawing/2014/main" id="{A8C87734-DEAC-7445-B5B3-FB7E42B5E4C7}"/>
+              </a:ext>
+            </a:extLst>
+          </p:cNvPr>
+          <p:cNvSpPr/>
+          <p:nvPr/>
+        </p:nvSpPr>
+        <p:spPr>
+          <a:xfrm>
+            <a:off x="8306171" y="4622826"/>
+            <a:ext cx="2385607" cy="987226"/>
+          </a:xfrm>
+          <a:prstGeom prst="flowChartDocument">
+            <a:avLst/>
+          </a:prstGeom>
+        </p:spPr>
+        <p:style>
+          <a:lnRef idx="2">
+            <a:schemeClr val="accent1">
+              <a:shade val="50000"/>
+            </a:schemeClr>
+          </a:lnRef>
+          <a:fillRef idx="1">
+            <a:schemeClr val="accent1"/>
+          </a:fillRef>
+          <a:effectRef idx="0">
+            <a:schemeClr val="accent1"/>
+          </a:effectRef>
+          <a:fontRef idx="minor">
+            <a:schemeClr val="lt1"/>
+          </a:fontRef>
+        </p:style>
+        <p:txBody>
+          <a:bodyPr rtlCol="0" anchor="ctr"/>
+          <a:lstStyle/>
+          <a:p>
+            <a:pPr algn="ctr"/>
+            <a:r>
+              <a:rPr lang="en-TW" sz="1200" dirty="0"/>
+              <a:t>Original Data Content</a:t>
+            </a:r>
+          </a:p>
+        </p:txBody>
+      </p:sp>
+      <p:grpSp>
+        <p:nvGrpSpPr>
+          <p:cNvPr id="58" name="Group 57">
+            <a:extLst>
+              <a:ext uri="{FF2B5EF4-FFF2-40B4-BE49-F238E27FC236}">
+                <a16:creationId xmlns:a16="http://schemas.microsoft.com/office/drawing/2014/main" id="{EAE0CAFD-3B13-164D-AF19-608820D52ACD}"/>
+              </a:ext>
+            </a:extLst>
+          </p:cNvPr>
+          <p:cNvGrpSpPr/>
+          <p:nvPr/>
+        </p:nvGrpSpPr>
+        <p:grpSpPr>
+          <a:xfrm>
+            <a:off x="9134243" y="3682268"/>
+            <a:ext cx="758541" cy="720000"/>
+            <a:chOff x="6725431" y="4309124"/>
+            <a:chExt cx="758541" cy="720000"/>
+          </a:xfrm>
+        </p:grpSpPr>
+        <p:sp>
+          <p:nvSpPr>
+            <p:cNvPr id="59" name="Chord 58">
+              <a:extLst>
+                <a:ext uri="{FF2B5EF4-FFF2-40B4-BE49-F238E27FC236}">
+                  <a16:creationId xmlns:a16="http://schemas.microsoft.com/office/drawing/2014/main" id="{7513D2B9-E14C-094E-951B-ECF1E6102844}"/>
+                </a:ext>
+              </a:extLst>
+            </p:cNvPr>
+            <p:cNvSpPr/>
+            <p:nvPr/>
+          </p:nvSpPr>
+          <p:spPr>
+            <a:xfrm>
+              <a:off x="6736419" y="4309124"/>
+              <a:ext cx="720000" cy="720000"/>
+            </a:xfrm>
+            <a:prstGeom prst="chord">
+              <a:avLst>
+                <a:gd name="adj1" fmla="val 10898648"/>
+                <a:gd name="adj2" fmla="val 21443894"/>
+              </a:avLst>
+            </a:prstGeom>
+          </p:spPr>
+          <p:style>
+            <a:lnRef idx="2">
+              <a:schemeClr val="accent1">
+                <a:shade val="50000"/>
+              </a:schemeClr>
+            </a:lnRef>
+            <a:fillRef idx="1">
+              <a:schemeClr val="accent1"/>
+            </a:fillRef>
+            <a:effectRef idx="0">
+              <a:schemeClr val="accent1"/>
+            </a:effectRef>
+            <a:fontRef idx="minor">
+              <a:schemeClr val="lt1"/>
+            </a:fontRef>
+          </p:style>
+          <p:txBody>
+            <a:bodyPr rtlCol="0" anchor="ctr"/>
+            <a:lstStyle/>
+            <a:p>
+              <a:pPr algn="ctr"/>
+              <a:endParaRPr lang="en-TW"/>
+            </a:p>
+          </p:txBody>
+        </p:sp>
+        <p:sp>
+          <p:nvSpPr>
+            <p:cNvPr id="60" name="TextBox 59">
+              <a:extLst>
+                <a:ext uri="{FF2B5EF4-FFF2-40B4-BE49-F238E27FC236}">
+                  <a16:creationId xmlns:a16="http://schemas.microsoft.com/office/drawing/2014/main" id="{68A45A75-B92F-9D42-A33D-A41F9737D1EA}"/>
+                </a:ext>
+              </a:extLst>
+            </p:cNvPr>
+            <p:cNvSpPr txBox="1"/>
+            <p:nvPr/>
+          </p:nvSpPr>
+          <p:spPr>
+            <a:xfrm>
+              <a:off x="6725431" y="4438894"/>
+              <a:ext cx="758541" cy="246221"/>
+            </a:xfrm>
+            <a:prstGeom prst="rect">
+              <a:avLst/>
+            </a:prstGeom>
+            <a:noFill/>
+          </p:spPr>
+          <p:txBody>
+            <a:bodyPr wrap="none" rtlCol="0">
+              <a:spAutoFit/>
+            </a:bodyPr>
+            <a:lstStyle/>
+            <a:p>
+              <a:r>
+                <a:rPr lang="en-TW" sz="1000" dirty="0">
+                  <a:solidFill>
+                    <a:schemeClr val="bg1"/>
+                  </a:solidFill>
+                </a:rPr>
+                <a:t>Pubic Key</a:t>
+              </a:r>
+            </a:p>
+          </p:txBody>
+        </p:sp>
+      </p:grpSp>
+      <p:grpSp>
+        <p:nvGrpSpPr>
+          <p:cNvPr id="62" name="Group 61">
+            <a:extLst>
+              <a:ext uri="{FF2B5EF4-FFF2-40B4-BE49-F238E27FC236}">
+                <a16:creationId xmlns:a16="http://schemas.microsoft.com/office/drawing/2014/main" id="{2C610F67-1D72-9147-A73E-71CB3C14E67B}"/>
+              </a:ext>
+            </a:extLst>
+          </p:cNvPr>
+          <p:cNvGrpSpPr/>
+          <p:nvPr/>
+        </p:nvGrpSpPr>
+        <p:grpSpPr>
+          <a:xfrm>
+            <a:off x="8206584" y="669252"/>
+            <a:ext cx="2658979" cy="1686508"/>
+            <a:chOff x="1087041" y="1455812"/>
+            <a:chExt cx="1693446" cy="1350695"/>
+          </a:xfrm>
+        </p:grpSpPr>
+        <p:sp>
+          <p:nvSpPr>
+            <p:cNvPr id="63" name="Rounded Rectangle 62">
+              <a:extLst>
+                <a:ext uri="{FF2B5EF4-FFF2-40B4-BE49-F238E27FC236}">
+                  <a16:creationId xmlns:a16="http://schemas.microsoft.com/office/drawing/2014/main" id="{3FE16E37-7C66-414D-BB34-BB3E3AE9BDBE}"/>
+                </a:ext>
+              </a:extLst>
+            </p:cNvPr>
+            <p:cNvSpPr/>
+            <p:nvPr/>
+          </p:nvSpPr>
+          <p:spPr>
+            <a:xfrm>
+              <a:off x="1087041" y="1455812"/>
+              <a:ext cx="1693446" cy="1350695"/>
+            </a:xfrm>
+            <a:prstGeom prst="roundRect">
+              <a:avLst/>
+            </a:prstGeom>
+            <a:solidFill>
+              <a:srgbClr val="FF0000">
+                <a:alpha val="50000"/>
+              </a:srgbClr>
+            </a:solidFill>
+          </p:spPr>
+          <p:style>
+            <a:lnRef idx="2">
+              <a:schemeClr val="accent1">
+                <a:shade val="50000"/>
+              </a:schemeClr>
+            </a:lnRef>
+            <a:fillRef idx="1">
+              <a:schemeClr val="accent1"/>
+            </a:fillRef>
+            <a:effectRef idx="0">
+              <a:schemeClr val="accent1"/>
+            </a:effectRef>
+            <a:fontRef idx="minor">
+              <a:schemeClr val="lt1"/>
+            </a:fontRef>
+          </p:style>
+          <p:txBody>
+            <a:bodyPr rtlCol="0" anchor="t"/>
+            <a:lstStyle/>
+            <a:p>
+              <a:r>
+                <a:rPr lang="en-TW" sz="1200" dirty="0">
+                  <a:solidFill>
+                    <a:schemeClr val="tx1"/>
+                  </a:solidFill>
+                </a:rPr>
+                <a:t>Decrypted </a:t>
+              </a:r>
+            </a:p>
+            <a:p>
+              <a:r>
+                <a:rPr lang="en-US" sz="1200" dirty="0">
+                  <a:solidFill>
+                    <a:schemeClr val="tx1"/>
+                  </a:solidFill>
+                </a:rPr>
+                <a:t>            b</a:t>
+              </a:r>
+              <a:r>
+                <a:rPr lang="en-TW" sz="1000" dirty="0">
+                  <a:solidFill>
+                    <a:schemeClr val="tx1"/>
+                  </a:solidFill>
+                </a:rPr>
+                <a:t>y</a:t>
+              </a:r>
+            </a:p>
+          </p:txBody>
+        </p:sp>
+        <p:sp>
+          <p:nvSpPr>
+            <p:cNvPr id="64" name="Document 63">
+              <a:extLst>
+                <a:ext uri="{FF2B5EF4-FFF2-40B4-BE49-F238E27FC236}">
+                  <a16:creationId xmlns:a16="http://schemas.microsoft.com/office/drawing/2014/main" id="{8F741F71-4B5C-B141-BC04-42EB754895C2}"/>
+                </a:ext>
+              </a:extLst>
+            </p:cNvPr>
+            <p:cNvSpPr/>
+            <p:nvPr/>
+          </p:nvSpPr>
+          <p:spPr>
+            <a:xfrm>
+              <a:off x="1165026" y="2121176"/>
+              <a:ext cx="1519341" cy="628173"/>
+            </a:xfrm>
+            <a:prstGeom prst="flowChartDocument">
+              <a:avLst/>
+            </a:prstGeom>
+          </p:spPr>
+          <p:style>
+            <a:lnRef idx="2">
+              <a:schemeClr val="accent1">
+                <a:shade val="50000"/>
+              </a:schemeClr>
+            </a:lnRef>
+            <a:fillRef idx="1">
+              <a:schemeClr val="accent1"/>
+            </a:fillRef>
+            <a:effectRef idx="0">
+              <a:schemeClr val="accent1"/>
+            </a:effectRef>
+            <a:fontRef idx="minor">
+              <a:schemeClr val="lt1"/>
+            </a:fontRef>
+          </p:style>
+          <p:txBody>
+            <a:bodyPr rtlCol="0" anchor="ctr"/>
+            <a:lstStyle/>
+            <a:p>
+              <a:pPr algn="ctr"/>
+              <a:r>
+                <a:rPr lang="en-TW" sz="1200" dirty="0"/>
+                <a:t>Original Data Content</a:t>
+              </a:r>
+            </a:p>
+          </p:txBody>
+        </p:sp>
+      </p:grpSp>
+      <p:sp>
+        <p:nvSpPr>
+          <p:cNvPr id="65" name="Oval 64">
+            <a:extLst>
+              <a:ext uri="{FF2B5EF4-FFF2-40B4-BE49-F238E27FC236}">
+                <a16:creationId xmlns:a16="http://schemas.microsoft.com/office/drawing/2014/main" id="{E69839CF-6149-3443-97A2-78AF8CC3BDAF}"/>
+              </a:ext>
+            </a:extLst>
+          </p:cNvPr>
+          <p:cNvSpPr/>
+          <p:nvPr/>
+        </p:nvSpPr>
+        <p:spPr>
+          <a:xfrm>
+            <a:off x="9116156" y="692438"/>
+            <a:ext cx="864000" cy="864000"/>
+          </a:xfrm>
+          <a:prstGeom prst="ellipse">
+            <a:avLst/>
+          </a:prstGeom>
+        </p:spPr>
+        <p:style>
+          <a:lnRef idx="2">
+            <a:schemeClr val="accent1">
+              <a:shade val="50000"/>
+            </a:schemeClr>
+          </a:lnRef>
+          <a:fillRef idx="1">
+            <a:schemeClr val="accent1"/>
+          </a:fillRef>
+          <a:effectRef idx="0">
+            <a:schemeClr val="accent1"/>
+          </a:effectRef>
+          <a:fontRef idx="minor">
+            <a:schemeClr val="lt1"/>
+          </a:fontRef>
+        </p:style>
+        <p:txBody>
+          <a:bodyPr rtlCol="0" anchor="ctr"/>
+          <a:lstStyle/>
+          <a:p>
+            <a:pPr algn="ctr"/>
+            <a:r>
+              <a:rPr lang="en-TW" sz="1000" dirty="0"/>
+              <a:t>Pass Phrase</a:t>
+            </a:r>
+          </a:p>
+        </p:txBody>
+      </p:sp>
+      <p:sp>
+        <p:nvSpPr>
+          <p:cNvPr id="66" name="Line Callout 2 65">
+            <a:extLst>
+              <a:ext uri="{FF2B5EF4-FFF2-40B4-BE49-F238E27FC236}">
+                <a16:creationId xmlns:a16="http://schemas.microsoft.com/office/drawing/2014/main" id="{C6753E30-D84C-4D41-91B6-2095CAEE0F34}"/>
+              </a:ext>
+            </a:extLst>
+          </p:cNvPr>
+          <p:cNvSpPr/>
+          <p:nvPr/>
+        </p:nvSpPr>
+        <p:spPr>
+          <a:xfrm>
+            <a:off x="6856303" y="5116439"/>
+            <a:ext cx="1092156" cy="1179921"/>
+          </a:xfrm>
+          <a:prstGeom prst="borderCallout2">
+            <a:avLst>
+              <a:gd name="adj1" fmla="val 71125"/>
+              <a:gd name="adj2" fmla="val 100863"/>
+              <a:gd name="adj3" fmla="val 71125"/>
+              <a:gd name="adj4" fmla="val 129310"/>
+              <a:gd name="adj5" fmla="val 65154"/>
+              <a:gd name="adj6" fmla="val 218368"/>
+            </a:avLst>
+          </a:prstGeom>
+          <a:solidFill>
+            <a:schemeClr val="bg1"/>
+          </a:solidFill>
+          <a:ln>
+            <a:prstDash val="sysDash"/>
+          </a:ln>
+        </p:spPr>
+        <p:style>
+          <a:lnRef idx="2">
+            <a:schemeClr val="accent1">
+              <a:shade val="50000"/>
+            </a:schemeClr>
+          </a:lnRef>
+          <a:fillRef idx="1">
+            <a:schemeClr val="accent1"/>
+          </a:fillRef>
+          <a:effectRef idx="0">
+            <a:schemeClr val="accent1"/>
+          </a:effectRef>
+          <a:fontRef idx="minor">
+            <a:schemeClr val="lt1"/>
+          </a:fontRef>
+        </p:style>
+        <p:txBody>
+          <a:bodyPr rtlCol="0" anchor="ctr"/>
+          <a:lstStyle/>
+          <a:p>
+            <a:pPr algn="ctr"/>
+            <a:r>
+              <a:rPr lang="en-TW" sz="1200" dirty="0">
+                <a:solidFill>
+                  <a:schemeClr val="tx1"/>
+                </a:solidFill>
+              </a:rPr>
+              <a:t>Private Key never have to be exposed</a:t>
+            </a:r>
+          </a:p>
+        </p:txBody>
+      </p:sp>
+      <p:grpSp>
+        <p:nvGrpSpPr>
+          <p:cNvPr id="70" name="Group 69">
+            <a:extLst>
+              <a:ext uri="{FF2B5EF4-FFF2-40B4-BE49-F238E27FC236}">
+                <a16:creationId xmlns:a16="http://schemas.microsoft.com/office/drawing/2014/main" id="{42F8B29C-72DD-874B-897F-DDE28B7E5CF9}"/>
+              </a:ext>
+            </a:extLst>
+          </p:cNvPr>
+          <p:cNvGrpSpPr/>
+          <p:nvPr/>
+        </p:nvGrpSpPr>
+        <p:grpSpPr>
+          <a:xfrm>
+            <a:off x="5259023" y="4639142"/>
+            <a:ext cx="758541" cy="720000"/>
+            <a:chOff x="6725431" y="4309124"/>
+            <a:chExt cx="758541" cy="720000"/>
+          </a:xfrm>
+        </p:grpSpPr>
+        <p:sp>
+          <p:nvSpPr>
+            <p:cNvPr id="71" name="Chord 70">
+              <a:extLst>
+                <a:ext uri="{FF2B5EF4-FFF2-40B4-BE49-F238E27FC236}">
+                  <a16:creationId xmlns:a16="http://schemas.microsoft.com/office/drawing/2014/main" id="{A4E7CDE7-01F7-4949-9F7C-A3F8717F7DC8}"/>
+                </a:ext>
+              </a:extLst>
+            </p:cNvPr>
+            <p:cNvSpPr/>
+            <p:nvPr/>
+          </p:nvSpPr>
+          <p:spPr>
+            <a:xfrm>
+              <a:off x="6736419" y="4309124"/>
+              <a:ext cx="720000" cy="720000"/>
+            </a:xfrm>
+            <a:prstGeom prst="chord">
+              <a:avLst>
+                <a:gd name="adj1" fmla="val 10898648"/>
+                <a:gd name="adj2" fmla="val 21443894"/>
+              </a:avLst>
+            </a:prstGeom>
+          </p:spPr>
+          <p:style>
+            <a:lnRef idx="2">
+              <a:schemeClr val="accent1">
+                <a:shade val="50000"/>
+              </a:schemeClr>
+            </a:lnRef>
+            <a:fillRef idx="1">
+              <a:schemeClr val="accent1"/>
+            </a:fillRef>
+            <a:effectRef idx="0">
+              <a:schemeClr val="accent1"/>
+            </a:effectRef>
+            <a:fontRef idx="minor">
+              <a:schemeClr val="lt1"/>
+            </a:fontRef>
+          </p:style>
+          <p:txBody>
+            <a:bodyPr rtlCol="0" anchor="ctr"/>
+            <a:lstStyle/>
+            <a:p>
+              <a:pPr algn="ctr"/>
+              <a:endParaRPr lang="en-TW"/>
+            </a:p>
+          </p:txBody>
+        </p:sp>
+        <p:sp>
+          <p:nvSpPr>
+            <p:cNvPr id="72" name="TextBox 71">
+              <a:extLst>
+                <a:ext uri="{FF2B5EF4-FFF2-40B4-BE49-F238E27FC236}">
+                  <a16:creationId xmlns:a16="http://schemas.microsoft.com/office/drawing/2014/main" id="{DAA52E96-C64D-8F4D-BCF0-D25B0CF4FDD1}"/>
+                </a:ext>
+              </a:extLst>
+            </p:cNvPr>
+            <p:cNvSpPr txBox="1"/>
+            <p:nvPr/>
+          </p:nvSpPr>
+          <p:spPr>
+            <a:xfrm>
+              <a:off x="6725431" y="4438894"/>
+              <a:ext cx="758541" cy="246221"/>
+            </a:xfrm>
+            <a:prstGeom prst="rect">
+              <a:avLst/>
+            </a:prstGeom>
+            <a:noFill/>
+          </p:spPr>
+          <p:txBody>
+            <a:bodyPr wrap="none" rtlCol="0">
+              <a:spAutoFit/>
+            </a:bodyPr>
+            <a:lstStyle/>
+            <a:p>
+              <a:r>
+                <a:rPr lang="en-TW" sz="1000" dirty="0">
+                  <a:solidFill>
+                    <a:schemeClr val="bg1"/>
+                  </a:solidFill>
+                </a:rPr>
+                <a:t>Pubic Key</a:t>
+              </a:r>
+            </a:p>
+          </p:txBody>
+        </p:sp>
+      </p:grpSp>
+      <p:grpSp>
+        <p:nvGrpSpPr>
+          <p:cNvPr id="73" name="Group 72">
+            <a:extLst>
+              <a:ext uri="{FF2B5EF4-FFF2-40B4-BE49-F238E27FC236}">
+                <a16:creationId xmlns:a16="http://schemas.microsoft.com/office/drawing/2014/main" id="{F1442A6C-FDB7-F342-885A-58FA4BC1F244}"/>
+              </a:ext>
+            </a:extLst>
+          </p:cNvPr>
+          <p:cNvGrpSpPr/>
+          <p:nvPr/>
+        </p:nvGrpSpPr>
+        <p:grpSpPr>
+          <a:xfrm>
+            <a:off x="5548601" y="4784440"/>
+            <a:ext cx="758541" cy="720000"/>
+            <a:chOff x="6725431" y="4309124"/>
+            <a:chExt cx="758541" cy="720000"/>
+          </a:xfrm>
+        </p:grpSpPr>
+        <p:sp>
+          <p:nvSpPr>
+            <p:cNvPr id="74" name="Chord 73">
+              <a:extLst>
+                <a:ext uri="{FF2B5EF4-FFF2-40B4-BE49-F238E27FC236}">
+                  <a16:creationId xmlns:a16="http://schemas.microsoft.com/office/drawing/2014/main" id="{04A59894-172C-444B-9A42-69C8B9C87EBD}"/>
+                </a:ext>
+              </a:extLst>
+            </p:cNvPr>
+            <p:cNvSpPr/>
+            <p:nvPr/>
+          </p:nvSpPr>
+          <p:spPr>
+            <a:xfrm>
+              <a:off x="6736419" y="4309124"/>
+              <a:ext cx="720000" cy="720000"/>
+            </a:xfrm>
+            <a:prstGeom prst="chord">
+              <a:avLst>
+                <a:gd name="adj1" fmla="val 10898648"/>
+                <a:gd name="adj2" fmla="val 21443894"/>
+              </a:avLst>
+            </a:prstGeom>
+          </p:spPr>
+          <p:style>
+            <a:lnRef idx="2">
+              <a:schemeClr val="accent1">
+                <a:shade val="50000"/>
+              </a:schemeClr>
+            </a:lnRef>
+            <a:fillRef idx="1">
+              <a:schemeClr val="accent1"/>
+            </a:fillRef>
+            <a:effectRef idx="0">
+              <a:schemeClr val="accent1"/>
+            </a:effectRef>
+            <a:fontRef idx="minor">
+              <a:schemeClr val="lt1"/>
+            </a:fontRef>
+          </p:style>
+          <p:txBody>
+            <a:bodyPr rtlCol="0" anchor="ctr"/>
+            <a:lstStyle/>
+            <a:p>
+              <a:pPr algn="ctr"/>
+              <a:endParaRPr lang="en-TW"/>
+            </a:p>
+          </p:txBody>
+        </p:sp>
+        <p:sp>
+          <p:nvSpPr>
+            <p:cNvPr id="75" name="TextBox 74">
+              <a:extLst>
+                <a:ext uri="{FF2B5EF4-FFF2-40B4-BE49-F238E27FC236}">
+                  <a16:creationId xmlns:a16="http://schemas.microsoft.com/office/drawing/2014/main" id="{D1A7289E-61C7-D045-9942-D0A2D0D36DF2}"/>
+                </a:ext>
+              </a:extLst>
+            </p:cNvPr>
+            <p:cNvSpPr txBox="1"/>
+            <p:nvPr/>
+          </p:nvSpPr>
+          <p:spPr>
+            <a:xfrm>
+              <a:off x="6725431" y="4438894"/>
+              <a:ext cx="758541" cy="246221"/>
+            </a:xfrm>
+            <a:prstGeom prst="rect">
+              <a:avLst/>
+            </a:prstGeom>
+            <a:noFill/>
+          </p:spPr>
+          <p:txBody>
+            <a:bodyPr wrap="none" rtlCol="0">
+              <a:spAutoFit/>
+            </a:bodyPr>
+            <a:lstStyle/>
+            <a:p>
+              <a:r>
+                <a:rPr lang="en-TW" sz="1000" dirty="0">
+                  <a:solidFill>
+                    <a:schemeClr val="bg1"/>
+                  </a:solidFill>
+                </a:rPr>
+                <a:t>Pubic Key</a:t>
+              </a:r>
+            </a:p>
+          </p:txBody>
+        </p:sp>
+      </p:grpSp>
+      <p:grpSp>
+        <p:nvGrpSpPr>
+          <p:cNvPr id="76" name="Group 75">
+            <a:extLst>
+              <a:ext uri="{FF2B5EF4-FFF2-40B4-BE49-F238E27FC236}">
+                <a16:creationId xmlns:a16="http://schemas.microsoft.com/office/drawing/2014/main" id="{F0291A2D-FBB4-4744-894B-2C7AE4B65F70}"/>
+              </a:ext>
+            </a:extLst>
+          </p:cNvPr>
+          <p:cNvGrpSpPr/>
+          <p:nvPr/>
+        </p:nvGrpSpPr>
+        <p:grpSpPr>
+          <a:xfrm>
+            <a:off x="5807196" y="4890052"/>
+            <a:ext cx="758541" cy="720000"/>
+            <a:chOff x="6725431" y="4309124"/>
+            <a:chExt cx="758541" cy="720000"/>
+          </a:xfrm>
+        </p:grpSpPr>
+        <p:sp>
+          <p:nvSpPr>
+            <p:cNvPr id="77" name="Chord 76">
+              <a:extLst>
+                <a:ext uri="{FF2B5EF4-FFF2-40B4-BE49-F238E27FC236}">
+                  <a16:creationId xmlns:a16="http://schemas.microsoft.com/office/drawing/2014/main" id="{877C21FA-D2E5-FF40-A3E6-62010DDDA94B}"/>
+                </a:ext>
+              </a:extLst>
+            </p:cNvPr>
+            <p:cNvSpPr/>
+            <p:nvPr/>
+          </p:nvSpPr>
+          <p:spPr>
+            <a:xfrm>
+              <a:off x="6736419" y="4309124"/>
+              <a:ext cx="720000" cy="720000"/>
+            </a:xfrm>
+            <a:prstGeom prst="chord">
+              <a:avLst>
+                <a:gd name="adj1" fmla="val 10898648"/>
+                <a:gd name="adj2" fmla="val 21443894"/>
+              </a:avLst>
+            </a:prstGeom>
+          </p:spPr>
+          <p:style>
+            <a:lnRef idx="2">
+              <a:schemeClr val="accent1">
+                <a:shade val="50000"/>
+              </a:schemeClr>
+            </a:lnRef>
+            <a:fillRef idx="1">
+              <a:schemeClr val="accent1"/>
+            </a:fillRef>
+            <a:effectRef idx="0">
+              <a:schemeClr val="accent1"/>
+            </a:effectRef>
+            <a:fontRef idx="minor">
+              <a:schemeClr val="lt1"/>
+            </a:fontRef>
+          </p:style>
+          <p:txBody>
+            <a:bodyPr rtlCol="0" anchor="ctr"/>
+            <a:lstStyle/>
+            <a:p>
+              <a:pPr algn="ctr"/>
+              <a:endParaRPr lang="en-TW" dirty="0"/>
+            </a:p>
+          </p:txBody>
+        </p:sp>
+        <p:sp>
+          <p:nvSpPr>
+            <p:cNvPr id="78" name="TextBox 77">
+              <a:extLst>
+                <a:ext uri="{FF2B5EF4-FFF2-40B4-BE49-F238E27FC236}">
+                  <a16:creationId xmlns:a16="http://schemas.microsoft.com/office/drawing/2014/main" id="{9165503E-B5A9-514C-AB25-B8E5983D0039}"/>
+                </a:ext>
+              </a:extLst>
+            </p:cNvPr>
+            <p:cNvSpPr txBox="1"/>
+            <p:nvPr/>
+          </p:nvSpPr>
+          <p:spPr>
+            <a:xfrm>
+              <a:off x="6725431" y="4438894"/>
+              <a:ext cx="758541" cy="246221"/>
+            </a:xfrm>
+            <a:prstGeom prst="rect">
+              <a:avLst/>
+            </a:prstGeom>
+            <a:noFill/>
+          </p:spPr>
+          <p:txBody>
+            <a:bodyPr wrap="none" rtlCol="0">
+              <a:spAutoFit/>
+            </a:bodyPr>
+            <a:lstStyle/>
+            <a:p>
+              <a:r>
+                <a:rPr lang="en-TW" sz="1000" dirty="0">
+                  <a:solidFill>
+                    <a:schemeClr val="bg1"/>
+                  </a:solidFill>
+                </a:rPr>
+                <a:t>Pubic Key</a:t>
+              </a:r>
+            </a:p>
+          </p:txBody>
+        </p:sp>
+      </p:grpSp>
+      <p:sp>
+        <p:nvSpPr>
+          <p:cNvPr id="79" name="Line Callout 2 78">
+            <a:extLst>
+              <a:ext uri="{FF2B5EF4-FFF2-40B4-BE49-F238E27FC236}">
+                <a16:creationId xmlns:a16="http://schemas.microsoft.com/office/drawing/2014/main" id="{AC99EFAC-66E4-6F4E-B9B6-22CC41883EB9}"/>
+              </a:ext>
+            </a:extLst>
+          </p:cNvPr>
+          <p:cNvSpPr/>
+          <p:nvPr/>
+        </p:nvSpPr>
+        <p:spPr>
+          <a:xfrm>
+            <a:off x="3875130" y="4784441"/>
+            <a:ext cx="1137114" cy="1454362"/>
+          </a:xfrm>
+          <a:prstGeom prst="borderCallout2">
+            <a:avLst>
+              <a:gd name="adj1" fmla="val 53053"/>
+              <a:gd name="adj2" fmla="val 100863"/>
+              <a:gd name="adj3" fmla="val 53053"/>
+              <a:gd name="adj4" fmla="val 132758"/>
+              <a:gd name="adj5" fmla="val 38955"/>
+              <a:gd name="adj6" fmla="val 179076"/>
+            </a:avLst>
+          </a:prstGeom>
+          <a:solidFill>
+            <a:schemeClr val="bg1"/>
+          </a:solidFill>
+          <a:ln>
+            <a:solidFill>
+              <a:schemeClr val="tx1"/>
+            </a:solidFill>
+            <a:prstDash val="sysDash"/>
+          </a:ln>
+        </p:spPr>
+        <p:style>
+          <a:lnRef idx="2">
+            <a:schemeClr val="accent1">
+              <a:shade val="50000"/>
+            </a:schemeClr>
+          </a:lnRef>
+          <a:fillRef idx="1">
+            <a:schemeClr val="accent1"/>
+          </a:fillRef>
+          <a:effectRef idx="0">
+            <a:schemeClr val="accent1"/>
+          </a:effectRef>
+          <a:fontRef idx="minor">
+            <a:schemeClr val="lt1"/>
+          </a:fontRef>
+        </p:style>
+        <p:txBody>
+          <a:bodyPr rtlCol="0" anchor="ctr"/>
+          <a:lstStyle/>
+          <a:p>
+            <a:pPr algn="ctr"/>
+            <a:r>
+              <a:rPr lang="en-TW" sz="1200" dirty="0">
+                <a:solidFill>
+                  <a:schemeClr val="tx1"/>
+                </a:solidFill>
+              </a:rPr>
+              <a:t>Public Keys can be retrieved from Open Namespaces</a:t>
+            </a:r>
+          </a:p>
+        </p:txBody>
+      </p:sp>
+      <p:cxnSp>
+        <p:nvCxnSpPr>
+          <p:cNvPr id="82" name="Straight Connector 81">
+            <a:extLst>
+              <a:ext uri="{FF2B5EF4-FFF2-40B4-BE49-F238E27FC236}">
+                <a16:creationId xmlns:a16="http://schemas.microsoft.com/office/drawing/2014/main" id="{352DD9D0-3A09-E243-BDF2-12FAB17BD0E0}"/>
+              </a:ext>
+            </a:extLst>
+          </p:cNvPr>
+          <p:cNvCxnSpPr>
+            <a:cxnSpLocks/>
+            <a:stCxn id="53" idx="3"/>
+          </p:cNvCxnSpPr>
+          <p:nvPr/>
+        </p:nvCxnSpPr>
+        <p:spPr>
+          <a:xfrm flipV="1">
+            <a:off x="2725973" y="3928311"/>
+            <a:ext cx="1248577" cy="6838"/>
+          </a:xfrm>
+          <a:prstGeom prst="line">
+            <a:avLst/>
+          </a:prstGeom>
+          <a:ln>
+            <a:solidFill>
+              <a:schemeClr val="tx1"/>
+            </a:solidFill>
+            <a:prstDash val="lgDash"/>
+          </a:ln>
+        </p:spPr>
+        <p:style>
+          <a:lnRef idx="1">
+            <a:schemeClr val="accent1"/>
+          </a:lnRef>
+          <a:fillRef idx="0">
+            <a:schemeClr val="accent1"/>
+          </a:fillRef>
+          <a:effectRef idx="0">
+            <a:schemeClr val="accent1"/>
+          </a:effectRef>
+          <a:fontRef idx="minor">
+            <a:schemeClr val="tx1"/>
+          </a:fontRef>
+        </p:style>
+      </p:cxnSp>
+      <p:cxnSp>
+        <p:nvCxnSpPr>
+          <p:cNvPr id="83" name="Straight Connector 82">
+            <a:extLst>
+              <a:ext uri="{FF2B5EF4-FFF2-40B4-BE49-F238E27FC236}">
+                <a16:creationId xmlns:a16="http://schemas.microsoft.com/office/drawing/2014/main" id="{DCA7FC1F-5855-F64B-A4F7-A1215EBD564D}"/>
+              </a:ext>
+            </a:extLst>
+          </p:cNvPr>
+          <p:cNvCxnSpPr>
+            <a:cxnSpLocks/>
+            <a:endCxn id="79" idx="3"/>
+          </p:cNvCxnSpPr>
+          <p:nvPr/>
+        </p:nvCxnSpPr>
+        <p:spPr>
+          <a:xfrm>
+            <a:off x="3974550" y="3928310"/>
+            <a:ext cx="469137" cy="856131"/>
+          </a:xfrm>
+          <a:prstGeom prst="line">
+            <a:avLst/>
+          </a:prstGeom>
+          <a:ln>
+            <a:solidFill>
+              <a:schemeClr val="tx1"/>
+            </a:solidFill>
+            <a:prstDash val="lgDash"/>
+          </a:ln>
+        </p:spPr>
+        <p:style>
+          <a:lnRef idx="1">
+            <a:schemeClr val="accent1"/>
+          </a:lnRef>
+          <a:fillRef idx="0">
+            <a:schemeClr val="accent1"/>
+          </a:fillRef>
+          <a:effectRef idx="0">
+            <a:schemeClr val="accent1"/>
+          </a:effectRef>
+          <a:fontRef idx="minor">
+            <a:schemeClr val="tx1"/>
+          </a:fontRef>
+        </p:style>
+      </p:cxnSp>
+      <p:cxnSp>
+        <p:nvCxnSpPr>
+          <p:cNvPr id="91" name="Straight Connector 90">
+            <a:extLst>
+              <a:ext uri="{FF2B5EF4-FFF2-40B4-BE49-F238E27FC236}">
+                <a16:creationId xmlns:a16="http://schemas.microsoft.com/office/drawing/2014/main" id="{6CEE8800-7445-B14E-9CCD-0E3D5063FD49}"/>
+              </a:ext>
+            </a:extLst>
+          </p:cNvPr>
+          <p:cNvCxnSpPr>
+            <a:cxnSpLocks/>
+            <a:stCxn id="80" idx="4"/>
+          </p:cNvCxnSpPr>
+          <p:nvPr/>
+        </p:nvCxnSpPr>
+        <p:spPr>
+          <a:xfrm flipV="1">
+            <a:off x="6738482" y="3943791"/>
+            <a:ext cx="938647" cy="778726"/>
+          </a:xfrm>
+          <a:prstGeom prst="line">
+            <a:avLst/>
+          </a:prstGeom>
+          <a:ln>
+            <a:solidFill>
+              <a:schemeClr val="tx1"/>
+            </a:solidFill>
+            <a:prstDash val="lgDash"/>
+          </a:ln>
+        </p:spPr>
+        <p:style>
+          <a:lnRef idx="1">
+            <a:schemeClr val="accent1"/>
+          </a:lnRef>
+          <a:fillRef idx="0">
+            <a:schemeClr val="accent1"/>
+          </a:fillRef>
+          <a:effectRef idx="0">
+            <a:schemeClr val="accent1"/>
+          </a:effectRef>
+          <a:fontRef idx="minor">
+            <a:schemeClr val="tx1"/>
+          </a:fontRef>
+        </p:style>
+      </p:cxnSp>
+      <p:cxnSp>
+        <p:nvCxnSpPr>
+          <p:cNvPr id="92" name="Straight Connector 91">
+            <a:extLst>
+              <a:ext uri="{FF2B5EF4-FFF2-40B4-BE49-F238E27FC236}">
+                <a16:creationId xmlns:a16="http://schemas.microsoft.com/office/drawing/2014/main" id="{F0D7DF63-8B90-4C41-B807-508AC50B8C53}"/>
+              </a:ext>
+            </a:extLst>
+          </p:cNvPr>
+          <p:cNvCxnSpPr>
+            <a:cxnSpLocks/>
+            <a:endCxn id="60" idx="1"/>
+          </p:cNvCxnSpPr>
+          <p:nvPr/>
+        </p:nvCxnSpPr>
+        <p:spPr>
+          <a:xfrm flipV="1">
+            <a:off x="7677129" y="3935149"/>
+            <a:ext cx="1457114" cy="8642"/>
+          </a:xfrm>
+          <a:prstGeom prst="line">
+            <a:avLst/>
+          </a:prstGeom>
+          <a:ln>
+            <a:solidFill>
+              <a:schemeClr val="tx1"/>
+            </a:solidFill>
+            <a:prstDash val="lgDash"/>
+          </a:ln>
+        </p:spPr>
+        <p:style>
+          <a:lnRef idx="1">
+            <a:schemeClr val="accent1"/>
+          </a:lnRef>
+          <a:fillRef idx="0">
+            <a:schemeClr val="accent1"/>
+          </a:fillRef>
+          <a:effectRef idx="0">
+            <a:schemeClr val="accent1"/>
+          </a:effectRef>
+          <a:fontRef idx="minor">
+            <a:schemeClr val="tx1"/>
+          </a:fontRef>
+        </p:style>
+      </p:cxnSp>
+    </p:spTree>
+    <p:extLst>
+      <p:ext uri="{BB962C8B-B14F-4D97-AF65-F5344CB8AC3E}">
+        <p14:creationId xmlns:p14="http://schemas.microsoft.com/office/powerpoint/2010/main" val="1755884025"/>
       </p:ext>
     </p:extLst>
   </p:cSld>

</xml_diff>